<commit_message>
more updates to the presentation
</commit_message>
<xml_diff>
--- a/ctrug.pptx
+++ b/ctrug.pptx
@@ -5,18 +5,19 @@
     <p:sldMasterId id="2147483648" r:id="rId1"/>
   </p:sldMasterIdLst>
   <p:notesMasterIdLst>
-    <p:notesMasterId r:id="rId11"/>
+    <p:notesMasterId r:id="rId12"/>
   </p:notesMasterIdLst>
   <p:sldIdLst>
     <p:sldId id="256" r:id="rId2"/>
-    <p:sldId id="257" r:id="rId3"/>
-    <p:sldId id="259" r:id="rId4"/>
-    <p:sldId id="261" r:id="rId5"/>
-    <p:sldId id="262" r:id="rId6"/>
-    <p:sldId id="264" r:id="rId7"/>
-    <p:sldId id="265" r:id="rId8"/>
-    <p:sldId id="263" r:id="rId9"/>
-    <p:sldId id="260" r:id="rId10"/>
+    <p:sldId id="266" r:id="rId3"/>
+    <p:sldId id="257" r:id="rId4"/>
+    <p:sldId id="259" r:id="rId5"/>
+    <p:sldId id="261" r:id="rId6"/>
+    <p:sldId id="262" r:id="rId7"/>
+    <p:sldId id="264" r:id="rId8"/>
+    <p:sldId id="265" r:id="rId9"/>
+    <p:sldId id="263" r:id="rId10"/>
+    <p:sldId id="260" r:id="rId11"/>
   </p:sldIdLst>
   <p:sldSz cx="9144000" cy="6858000" type="screen4x3"/>
   <p:notesSz cx="6858000" cy="9144000"/>
@@ -533,7 +534,7 @@
           <a:p>
             <a:fld id="{EDF527AC-2892-4C4B-B46F-80830B5ED1D2}" type="slidenum">
               <a:rPr lang="en-US" smtClean="0"/>
-              <a:t>4</a:t>
+              <a:t>5</a:t>
             </a:fld>
             <a:endParaRPr lang="en-US"/>
           </a:p>
@@ -3555,7 +3556,12 @@
           <a:bodyPr/>
           <a:lstStyle/>
           <a:p>
-            <a:endParaRPr lang="en-US"/>
+            <a:pPr algn="r"/>
+            <a:r>
+              <a:rPr lang="en-US" dirty="0" smtClean="0"/>
+              <a:t>Happy, Sad, Indifferent – Quantifying Text Sentiment in R</a:t>
+            </a:r>
+            <a:endParaRPr lang="en-US" dirty="0"/>
           </a:p>
         </p:txBody>
       </p:sp>
@@ -3569,12 +3575,38 @@
             <p:ph type="subTitle" idx="1"/>
           </p:nvPr>
         </p:nvSpPr>
-        <p:spPr/>
-        <p:txBody>
-          <a:bodyPr/>
-          <a:lstStyle/>
-          <a:p>
-            <a:endParaRPr lang="en-US"/>
+        <p:spPr>
+          <a:xfrm>
+            <a:off x="1371600" y="4334475"/>
+            <a:ext cx="6400800" cy="1752600"/>
+          </a:xfrm>
+        </p:spPr>
+        <p:txBody>
+          <a:bodyPr>
+            <a:normAutofit fontScale="85000" lnSpcReduction="20000"/>
+          </a:bodyPr>
+          <a:lstStyle/>
+          <a:p>
+            <a:r>
+              <a:rPr lang="en-US" dirty="0" smtClean="0"/>
+              <a:t>Rajarshi Guha</a:t>
+            </a:r>
+          </a:p>
+          <a:p>
+            <a:endParaRPr lang="en-US" dirty="0"/>
+          </a:p>
+          <a:p>
+            <a:r>
+              <a:rPr lang="en-US" dirty="0" smtClean="0"/>
+              <a:t>CT R Users Group</a:t>
+            </a:r>
+          </a:p>
+          <a:p>
+            <a:r>
+              <a:rPr lang="en-US" dirty="0" smtClean="0"/>
+              <a:t>May 2012</a:t>
+            </a:r>
+            <a:endParaRPr lang="en-US" dirty="0"/>
           </a:p>
         </p:txBody>
       </p:sp>
@@ -3582,6 +3614,78 @@
     <p:extLst>
       <p:ext uri="{BB962C8B-B14F-4D97-AF65-F5344CB8AC3E}">
         <p14:creationId xmlns:p14="http://schemas.microsoft.com/office/powerpoint/2010/main" val="2978120672"/>
+      </p:ext>
+    </p:extLst>
+  </p:cSld>
+  <p:clrMapOvr>
+    <a:masterClrMapping/>
+  </p:clrMapOvr>
+</p:sld>
+</file>
+
+<file path=ppt/slides/slide10.xml><?xml version="1.0" encoding="utf-8"?>
+<p:sld xmlns:a="http://schemas.openxmlformats.org/drawingml/2006/main" xmlns:r="http://schemas.openxmlformats.org/officeDocument/2006/relationships" xmlns:p="http://schemas.openxmlformats.org/presentationml/2006/main">
+  <p:cSld>
+    <p:spTree>
+      <p:nvGrpSpPr>
+        <p:cNvPr id="1" name=""/>
+        <p:cNvGrpSpPr/>
+        <p:nvPr/>
+      </p:nvGrpSpPr>
+      <p:grpSpPr>
+        <a:xfrm>
+          <a:off x="0" y="0"/>
+          <a:ext cx="0" cy="0"/>
+          <a:chOff x="0" y="0"/>
+          <a:chExt cx="0" cy="0"/>
+        </a:xfrm>
+      </p:grpSpPr>
+      <p:sp>
+        <p:nvSpPr>
+          <p:cNvPr id="2" name="Title 1"/>
+          <p:cNvSpPr>
+            <a:spLocks noGrp="1"/>
+          </p:cNvSpPr>
+          <p:nvPr>
+            <p:ph type="title"/>
+          </p:nvPr>
+        </p:nvSpPr>
+        <p:spPr/>
+        <p:txBody>
+          <a:bodyPr/>
+          <a:lstStyle/>
+          <a:p>
+            <a:r>
+              <a:rPr lang="en-US" dirty="0" smtClean="0"/>
+              <a:t>Sentiment and Geography</a:t>
+            </a:r>
+            <a:endParaRPr lang="en-US" dirty="0"/>
+          </a:p>
+        </p:txBody>
+      </p:sp>
+      <p:sp>
+        <p:nvSpPr>
+          <p:cNvPr id="3" name="Content Placeholder 2"/>
+          <p:cNvSpPr>
+            <a:spLocks noGrp="1"/>
+          </p:cNvSpPr>
+          <p:nvPr>
+            <p:ph idx="1"/>
+          </p:nvPr>
+        </p:nvSpPr>
+        <p:spPr/>
+        <p:txBody>
+          <a:bodyPr/>
+          <a:lstStyle/>
+          <a:p>
+            <a:endParaRPr lang="en-US"/>
+          </a:p>
+        </p:txBody>
+      </p:sp>
+    </p:spTree>
+    <p:extLst>
+      <p:ext uri="{BB962C8B-B14F-4D97-AF65-F5344CB8AC3E}">
+        <p14:creationId xmlns:p14="http://schemas.microsoft.com/office/powerpoint/2010/main" val="2467920415"/>
       </p:ext>
     </p:extLst>
   </p:cSld>
@@ -3625,7 +3729,7 @@
           <a:p>
             <a:r>
               <a:rPr lang="en-US" dirty="0" smtClean="0"/>
-              <a:t>Getting Twitter Data</a:t>
+              <a:t>Preamble</a:t>
             </a:r>
             <a:endParaRPr lang="en-US" dirty="0"/>
           </a:p>
@@ -3647,48 +3751,44 @@
           <a:lstStyle/>
           <a:p>
             <a:r>
-              <a:rPr lang="en-US" dirty="0" smtClean="0"/>
-              <a:t>Accessing Twitter is relatively easy using many languages</a:t>
-            </a:r>
-          </a:p>
-          <a:p>
-            <a:pPr lvl="1"/>
-            <a:r>
-              <a:rPr lang="en-US" dirty="0" smtClean="0"/>
-              <a:t>We obtained tweets via a PHP client running over an extended period of time</a:t>
-            </a:r>
-          </a:p>
-          <a:p>
-            <a:r>
-              <a:rPr lang="en-US" dirty="0" smtClean="0"/>
-              <a:t>Won’t focus on accessing Twitter data from within R</a:t>
-            </a:r>
-          </a:p>
-          <a:p>
-            <a:pPr lvl="1"/>
-            <a:r>
-              <a:rPr lang="en-US" dirty="0" smtClean="0"/>
-              <a:t>Very straightforward with </a:t>
-            </a:r>
-            <a:r>
-              <a:rPr lang="en-US" b="1" dirty="0" err="1" smtClean="0">
-                <a:latin typeface="Consolas"/>
-                <a:cs typeface="Consolas"/>
+              <a:rPr lang="en-US" dirty="0">
                 <a:hlinkClick r:id="rId2"/>
               </a:rPr>
-              <a:t>twitteR</a:t>
-            </a:r>
-            <a:endParaRPr lang="en-US" b="1" dirty="0">
-              <a:latin typeface="Consolas"/>
-              <a:cs typeface="Consolas"/>
-            </a:endParaRPr>
+              <a:t>https://github.com/rajarshi/ctrug-</a:t>
+            </a:r>
+            <a:r>
+              <a:rPr lang="en-US" dirty="0" smtClean="0">
+                <a:hlinkClick r:id="rId2"/>
+              </a:rPr>
+              <a:t>tweet</a:t>
+            </a:r>
+            <a:endParaRPr lang="en-US" dirty="0" smtClean="0"/>
+          </a:p>
+          <a:p>
+            <a:r>
+              <a:rPr lang="en-US" dirty="0" smtClean="0"/>
+              <a:t>Focus is on using R to perform this task</a:t>
+            </a:r>
+          </a:p>
+          <a:p>
+            <a:r>
+              <a:rPr lang="en-US" dirty="0" smtClean="0"/>
+              <a:t>Won’t comment on validity, rigor, utility, … of sentiment analysis methods</a:t>
+            </a:r>
+          </a:p>
+          <a:p>
+            <a:r>
+              <a:rPr lang="en-US" dirty="0" smtClean="0"/>
+              <a:t>Some of the example data is available freely, other parts available on request </a:t>
+            </a:r>
+            <a:endParaRPr lang="en-US" dirty="0"/>
           </a:p>
         </p:txBody>
       </p:sp>
     </p:spTree>
     <p:extLst>
       <p:ext uri="{BB962C8B-B14F-4D97-AF65-F5344CB8AC3E}">
-        <p14:creationId xmlns:p14="http://schemas.microsoft.com/office/powerpoint/2010/main" val="1921555537"/>
+        <p14:creationId xmlns:p14="http://schemas.microsoft.com/office/powerpoint/2010/main" val="1552737729"/>
       </p:ext>
     </p:extLst>
   </p:cSld>
@@ -3732,6 +3832,113 @@
           <a:p>
             <a:r>
               <a:rPr lang="en-US" dirty="0" smtClean="0"/>
+              <a:t>Getting Twitter Data</a:t>
+            </a:r>
+            <a:endParaRPr lang="en-US" dirty="0"/>
+          </a:p>
+        </p:txBody>
+      </p:sp>
+      <p:sp>
+        <p:nvSpPr>
+          <p:cNvPr id="3" name="Content Placeholder 2"/>
+          <p:cNvSpPr>
+            <a:spLocks noGrp="1"/>
+          </p:cNvSpPr>
+          <p:nvPr>
+            <p:ph idx="1"/>
+          </p:nvPr>
+        </p:nvSpPr>
+        <p:spPr/>
+        <p:txBody>
+          <a:bodyPr/>
+          <a:lstStyle/>
+          <a:p>
+            <a:r>
+              <a:rPr lang="en-US" dirty="0" smtClean="0"/>
+              <a:t>Accessing Twitter is relatively easy using many languages</a:t>
+            </a:r>
+          </a:p>
+          <a:p>
+            <a:pPr lvl="1"/>
+            <a:r>
+              <a:rPr lang="en-US" dirty="0" smtClean="0"/>
+              <a:t>We obtained tweets via a PHP client running over an extended period of time</a:t>
+            </a:r>
+          </a:p>
+          <a:p>
+            <a:r>
+              <a:rPr lang="en-US" dirty="0" smtClean="0"/>
+              <a:t>Won’t focus on accessing Twitter data from within R</a:t>
+            </a:r>
+          </a:p>
+          <a:p>
+            <a:pPr lvl="1"/>
+            <a:r>
+              <a:rPr lang="en-US" dirty="0" smtClean="0"/>
+              <a:t>Very straightforward with </a:t>
+            </a:r>
+            <a:r>
+              <a:rPr lang="en-US" b="1" dirty="0" err="1" smtClean="0">
+                <a:latin typeface="Consolas"/>
+                <a:cs typeface="Consolas"/>
+                <a:hlinkClick r:id="rId2"/>
+              </a:rPr>
+              <a:t>twitteR</a:t>
+            </a:r>
+            <a:endParaRPr lang="en-US" b="1" dirty="0">
+              <a:latin typeface="Consolas"/>
+              <a:cs typeface="Consolas"/>
+            </a:endParaRPr>
+          </a:p>
+        </p:txBody>
+      </p:sp>
+    </p:spTree>
+    <p:extLst>
+      <p:ext uri="{BB962C8B-B14F-4D97-AF65-F5344CB8AC3E}">
+        <p14:creationId xmlns:p14="http://schemas.microsoft.com/office/powerpoint/2010/main" val="1921555537"/>
+      </p:ext>
+    </p:extLst>
+  </p:cSld>
+  <p:clrMapOvr>
+    <a:masterClrMapping/>
+  </p:clrMapOvr>
+</p:sld>
+</file>
+
+<file path=ppt/slides/slide4.xml><?xml version="1.0" encoding="utf-8"?>
+<p:sld xmlns:a="http://schemas.openxmlformats.org/drawingml/2006/main" xmlns:r="http://schemas.openxmlformats.org/officeDocument/2006/relationships" xmlns:p="http://schemas.openxmlformats.org/presentationml/2006/main">
+  <p:cSld>
+    <p:spTree>
+      <p:nvGrpSpPr>
+        <p:cNvPr id="1" name=""/>
+        <p:cNvGrpSpPr/>
+        <p:nvPr/>
+      </p:nvGrpSpPr>
+      <p:grpSpPr>
+        <a:xfrm>
+          <a:off x="0" y="0"/>
+          <a:ext cx="0" cy="0"/>
+          <a:chOff x="0" y="0"/>
+          <a:chExt cx="0" cy="0"/>
+        </a:xfrm>
+      </p:grpSpPr>
+      <p:sp>
+        <p:nvSpPr>
+          <p:cNvPr id="2" name="Title 1"/>
+          <p:cNvSpPr>
+            <a:spLocks noGrp="1"/>
+          </p:cNvSpPr>
+          <p:nvPr>
+            <p:ph type="title"/>
+          </p:nvPr>
+        </p:nvSpPr>
+        <p:spPr/>
+        <p:txBody>
+          <a:bodyPr/>
+          <a:lstStyle/>
+          <a:p>
+            <a:r>
+              <a:rPr lang="en-US" dirty="0" smtClean="0"/>
               <a:t>Quantifying Sentiment</a:t>
             </a:r>
             <a:endParaRPr lang="en-US" dirty="0"/>
@@ -3791,7 +3998,7 @@
 </p:sld>
 </file>
 
-<file path=ppt/slides/slide4.xml><?xml version="1.0" encoding="utf-8"?>
+<file path=ppt/slides/slide5.xml><?xml version="1.0" encoding="utf-8"?>
 <p:sld xmlns:a="http://schemas.openxmlformats.org/drawingml/2006/main" xmlns:r="http://schemas.openxmlformats.org/officeDocument/2006/relationships" xmlns:p="http://schemas.openxmlformats.org/presentationml/2006/main">
   <p:cSld>
     <p:spTree>
@@ -3962,103 +4169,6 @@
 </p:sld>
 </file>
 
-<file path=ppt/slides/slide5.xml><?xml version="1.0" encoding="utf-8"?>
-<p:sld xmlns:a="http://schemas.openxmlformats.org/drawingml/2006/main" xmlns:r="http://schemas.openxmlformats.org/officeDocument/2006/relationships" xmlns:p="http://schemas.openxmlformats.org/presentationml/2006/main">
-  <p:cSld>
-    <p:spTree>
-      <p:nvGrpSpPr>
-        <p:cNvPr id="1" name=""/>
-        <p:cNvGrpSpPr/>
-        <p:nvPr/>
-      </p:nvGrpSpPr>
-      <p:grpSpPr>
-        <a:xfrm>
-          <a:off x="0" y="0"/>
-          <a:ext cx="0" cy="0"/>
-          <a:chOff x="0" y="0"/>
-          <a:chExt cx="0" cy="0"/>
-        </a:xfrm>
-      </p:grpSpPr>
-      <p:sp>
-        <p:nvSpPr>
-          <p:cNvPr id="2" name="Title 1"/>
-          <p:cNvSpPr>
-            <a:spLocks noGrp="1"/>
-          </p:cNvSpPr>
-          <p:nvPr>
-            <p:ph type="title"/>
-          </p:nvPr>
-        </p:nvSpPr>
-        <p:spPr/>
-        <p:txBody>
-          <a:bodyPr/>
-          <a:lstStyle/>
-          <a:p>
-            <a:r>
-              <a:rPr lang="en-US" dirty="0" err="1" smtClean="0"/>
-              <a:t>SentiWordNet</a:t>
-            </a:r>
-            <a:endParaRPr lang="en-US" dirty="0"/>
-          </a:p>
-        </p:txBody>
-      </p:sp>
-      <p:sp>
-        <p:nvSpPr>
-          <p:cNvPr id="3" name="Content Placeholder 2"/>
-          <p:cNvSpPr>
-            <a:spLocks noGrp="1"/>
-          </p:cNvSpPr>
-          <p:nvPr>
-            <p:ph idx="1"/>
-          </p:nvPr>
-        </p:nvSpPr>
-        <p:spPr/>
-        <p:txBody>
-          <a:bodyPr/>
-          <a:lstStyle/>
-          <a:p>
-            <a:r>
-              <a:rPr lang="en-US" dirty="0" smtClean="0"/>
-              <a:t>Most words are neutral (</a:t>
-            </a:r>
-            <a:r>
-              <a:rPr lang="en-US" dirty="0" err="1" smtClean="0"/>
-              <a:t>ObjScore</a:t>
-            </a:r>
-            <a:r>
-              <a:rPr lang="en-US" dirty="0" smtClean="0"/>
-              <a:t> = 1.0)</a:t>
-            </a:r>
-          </a:p>
-          <a:p>
-            <a:r>
-              <a:rPr lang="en-US" dirty="0" smtClean="0"/>
-              <a:t>To derive a score for a tweet, we should ideally perform POS tagging</a:t>
-            </a:r>
-          </a:p>
-          <a:p>
-            <a:pPr lvl="1"/>
-            <a:r>
-              <a:rPr lang="en-US" dirty="0" smtClean="0"/>
-              <a:t>Many cases where the same term can be used as different POS and scores will differ </a:t>
-            </a:r>
-            <a:endParaRPr lang="en-US" dirty="0"/>
-          </a:p>
-        </p:txBody>
-      </p:sp>
-    </p:spTree>
-    <p:extLst>
-      <p:ext uri="{BB962C8B-B14F-4D97-AF65-F5344CB8AC3E}">
-        <p14:creationId xmlns:p14="http://schemas.microsoft.com/office/powerpoint/2010/main" val="4288015244"/>
-      </p:ext>
-    </p:extLst>
-  </p:cSld>
-  <p:clrMapOvr>
-    <a:masterClrMapping/>
-  </p:clrMapOvr>
-</p:sld>
-</file>
-
 <file path=ppt/slides/slide6.xml><?xml version="1.0" encoding="utf-8"?>
 <p:sld xmlns:a="http://schemas.openxmlformats.org/drawingml/2006/main" xmlns:r="http://schemas.openxmlformats.org/officeDocument/2006/relationships" xmlns:p="http://schemas.openxmlformats.org/presentationml/2006/main">
   <p:cSld>
@@ -4092,6 +4202,103 @@
           <a:lstStyle/>
           <a:p>
             <a:r>
+              <a:rPr lang="en-US" dirty="0" err="1" smtClean="0"/>
+              <a:t>SentiWordNet</a:t>
+            </a:r>
+            <a:endParaRPr lang="en-US" dirty="0"/>
+          </a:p>
+        </p:txBody>
+      </p:sp>
+      <p:sp>
+        <p:nvSpPr>
+          <p:cNvPr id="3" name="Content Placeholder 2"/>
+          <p:cNvSpPr>
+            <a:spLocks noGrp="1"/>
+          </p:cNvSpPr>
+          <p:nvPr>
+            <p:ph idx="1"/>
+          </p:nvPr>
+        </p:nvSpPr>
+        <p:spPr/>
+        <p:txBody>
+          <a:bodyPr/>
+          <a:lstStyle/>
+          <a:p>
+            <a:r>
+              <a:rPr lang="en-US" dirty="0" smtClean="0"/>
+              <a:t>Most words are neutral (</a:t>
+            </a:r>
+            <a:r>
+              <a:rPr lang="en-US" dirty="0" err="1" smtClean="0"/>
+              <a:t>ObjScore</a:t>
+            </a:r>
+            <a:r>
+              <a:rPr lang="en-US" dirty="0" smtClean="0"/>
+              <a:t> = 1.0)</a:t>
+            </a:r>
+          </a:p>
+          <a:p>
+            <a:r>
+              <a:rPr lang="en-US" dirty="0" smtClean="0"/>
+              <a:t>To derive a score for a tweet, we should ideally perform POS tagging</a:t>
+            </a:r>
+          </a:p>
+          <a:p>
+            <a:pPr lvl="1"/>
+            <a:r>
+              <a:rPr lang="en-US" dirty="0" smtClean="0"/>
+              <a:t>Many cases where the same term can be used as different POS and scores will differ </a:t>
+            </a:r>
+            <a:endParaRPr lang="en-US" dirty="0"/>
+          </a:p>
+        </p:txBody>
+      </p:sp>
+    </p:spTree>
+    <p:extLst>
+      <p:ext uri="{BB962C8B-B14F-4D97-AF65-F5344CB8AC3E}">
+        <p14:creationId xmlns:p14="http://schemas.microsoft.com/office/powerpoint/2010/main" val="4288015244"/>
+      </p:ext>
+    </p:extLst>
+  </p:cSld>
+  <p:clrMapOvr>
+    <a:masterClrMapping/>
+  </p:clrMapOvr>
+</p:sld>
+</file>
+
+<file path=ppt/slides/slide7.xml><?xml version="1.0" encoding="utf-8"?>
+<p:sld xmlns:a="http://schemas.openxmlformats.org/drawingml/2006/main" xmlns:r="http://schemas.openxmlformats.org/officeDocument/2006/relationships" xmlns:p="http://schemas.openxmlformats.org/presentationml/2006/main">
+  <p:cSld>
+    <p:spTree>
+      <p:nvGrpSpPr>
+        <p:cNvPr id="1" name=""/>
+        <p:cNvGrpSpPr/>
+        <p:nvPr/>
+      </p:nvGrpSpPr>
+      <p:grpSpPr>
+        <a:xfrm>
+          <a:off x="0" y="0"/>
+          <a:ext cx="0" cy="0"/>
+          <a:chOff x="0" y="0"/>
+          <a:chExt cx="0" cy="0"/>
+        </a:xfrm>
+      </p:grpSpPr>
+      <p:sp>
+        <p:nvSpPr>
+          <p:cNvPr id="2" name="Title 1"/>
+          <p:cNvSpPr>
+            <a:spLocks noGrp="1"/>
+          </p:cNvSpPr>
+          <p:nvPr>
+            <p:ph type="title"/>
+          </p:nvPr>
+        </p:nvSpPr>
+        <p:spPr/>
+        <p:txBody>
+          <a:bodyPr/>
+          <a:lstStyle/>
+          <a:p>
+            <a:r>
               <a:rPr lang="en-US" dirty="0" smtClean="0"/>
               <a:t>Scoring Tweets</a:t>
             </a:r>
@@ -4193,8 +4400,8 @@
         </p:nvSpPr>
         <p:spPr>
           <a:xfrm>
-            <a:off x="3136900" y="2454811"/>
-            <a:ext cx="5712421" cy="4031873"/>
+            <a:off x="3276600" y="2188111"/>
+            <a:ext cx="5712421" cy="4524316"/>
           </a:xfrm>
           <a:prstGeom prst="rect">
             <a:avLst/>
@@ -4224,10 +4431,101 @@
           <a:lstStyle/>
           <a:p>
             <a:r>
+              <a:rPr lang="en-US" sz="1600" dirty="0" err="1">
+                <a:latin typeface="Consolas"/>
+                <a:cs typeface="Consolas"/>
+              </a:rPr>
+              <a:t>swn</a:t>
+            </a:r>
+            <a:r>
+              <a:rPr lang="en-US" sz="1600" dirty="0">
+                <a:latin typeface="Consolas"/>
+                <a:cs typeface="Consolas"/>
+              </a:rPr>
+              <a:t> &lt;- </a:t>
+            </a:r>
+            <a:r>
+              <a:rPr lang="en-US" sz="1600" dirty="0" err="1">
+                <a:latin typeface="Consolas"/>
+                <a:cs typeface="Consolas"/>
+              </a:rPr>
+              <a:t>read.csv</a:t>
+            </a:r>
+            <a:r>
+              <a:rPr lang="en-US" sz="1600" dirty="0">
+                <a:latin typeface="Consolas"/>
+                <a:cs typeface="Consolas"/>
+              </a:rPr>
+              <a:t>('</a:t>
+            </a:r>
+            <a:r>
+              <a:rPr lang="en-US" sz="1600" dirty="0" err="1">
+                <a:latin typeface="Consolas"/>
+                <a:cs typeface="Consolas"/>
+              </a:rPr>
+              <a:t>sentinet_r.csv</a:t>
+            </a:r>
+            <a:r>
+              <a:rPr lang="en-US" sz="1600" dirty="0">
+                <a:latin typeface="Consolas"/>
+                <a:cs typeface="Consolas"/>
+              </a:rPr>
+              <a:t>', header=TRUE, </a:t>
+            </a:r>
+            <a:endParaRPr lang="en-US" sz="1600" dirty="0" smtClean="0">
+              <a:latin typeface="Consolas"/>
+              <a:cs typeface="Consolas"/>
+            </a:endParaRPr>
+          </a:p>
+          <a:p>
+            <a:r>
+              <a:rPr lang="en-US" sz="1600" dirty="0">
+                <a:latin typeface="Consolas"/>
+                <a:cs typeface="Consolas"/>
+              </a:rPr>
+              <a:t> </a:t>
+            </a:r>
+            <a:r>
+              <a:rPr lang="en-US" sz="1600" dirty="0" smtClean="0">
+                <a:latin typeface="Consolas"/>
+                <a:cs typeface="Consolas"/>
+              </a:rPr>
+              <a:t>               </a:t>
+            </a:r>
+            <a:r>
               <a:rPr lang="en-US" sz="1600" dirty="0" err="1" smtClean="0">
                 <a:latin typeface="Consolas"/>
                 <a:cs typeface="Consolas"/>
               </a:rPr>
+              <a:t>as.is</a:t>
+            </a:r>
+            <a:r>
+              <a:rPr lang="en-US" sz="1600" dirty="0">
+                <a:latin typeface="Consolas"/>
+                <a:cs typeface="Consolas"/>
+              </a:rPr>
+              <a:t>=TRUE</a:t>
+            </a:r>
+            <a:r>
+              <a:rPr lang="en-US" sz="1600" dirty="0" smtClean="0">
+                <a:latin typeface="Consolas"/>
+                <a:cs typeface="Consolas"/>
+              </a:rPr>
+              <a:t>)</a:t>
+            </a:r>
+          </a:p>
+          <a:p>
+            <a:endParaRPr lang="en-US" sz="1600" dirty="0">
+              <a:latin typeface="Consolas"/>
+              <a:cs typeface="Consolas"/>
+            </a:endParaRPr>
+          </a:p>
+          <a:p>
+            <a:r>
+              <a:rPr lang="en-US" sz="1600" dirty="0" err="1" smtClean="0">
+                <a:latin typeface="Consolas"/>
+                <a:cs typeface="Consolas"/>
+              </a:rPr>
               <a:t>swn.match</a:t>
             </a:r>
             <a:r>
@@ -4235,15 +4533,22 @@
                 <a:latin typeface="Consolas"/>
                 <a:cs typeface="Consolas"/>
               </a:rPr>
-              <a:t> &lt;- function(w) {</a:t>
-            </a:r>
-          </a:p>
-          <a:p>
+              <a:t> </a:t>
+            </a:r>
             <a:r>
               <a:rPr lang="en-US" sz="1600" dirty="0" smtClean="0">
                 <a:latin typeface="Consolas"/>
                 <a:cs typeface="Consolas"/>
               </a:rPr>
+              <a:t>&lt;- function(w) {</a:t>
+            </a:r>
+          </a:p>
+          <a:p>
+            <a:r>
+              <a:rPr lang="en-US" sz="1600" dirty="0" smtClean="0">
+                <a:latin typeface="Consolas"/>
+                <a:cs typeface="Consolas"/>
+              </a:rPr>
               <a:t>  </a:t>
             </a:r>
             <a:r>
@@ -4309,16 +4614,21 @@
                 <a:latin typeface="Consolas"/>
                 <a:cs typeface="Consolas"/>
               </a:rPr>
-              <a:t>) &gt;= 1)</a:t>
-            </a:r>
-          </a:p>
-          <a:p>
+              <a:t>) &gt;= 1</a:t>
+            </a:r>
             <a:r>
               <a:rPr lang="en-US" sz="1600" dirty="0" smtClean="0">
                 <a:latin typeface="Consolas"/>
                 <a:cs typeface="Consolas"/>
               </a:rPr>
-              <a:t>    return(</a:t>
+              <a:t>) return</a:t>
+            </a:r>
+            <a:r>
+              <a:rPr lang="en-US" sz="1600" dirty="0" smtClean="0">
+                <a:latin typeface="Consolas"/>
+                <a:cs typeface="Consolas"/>
+              </a:rPr>
+              <a:t>(</a:t>
             </a:r>
             <a:r>
               <a:rPr lang="en-US" sz="1600" dirty="0" err="1" smtClean="0">
@@ -4631,7 +4941,7 @@
 </p:sld>
 </file>
 
-<file path=ppt/slides/slide7.xml><?xml version="1.0" encoding="utf-8"?>
+<file path=ppt/slides/slide8.xml><?xml version="1.0" encoding="utf-8"?>
 <p:sld xmlns:a="http://schemas.openxmlformats.org/drawingml/2006/main" xmlns:r="http://schemas.openxmlformats.org/officeDocument/2006/relationships" xmlns:p="http://schemas.openxmlformats.org/presentationml/2006/main">
   <p:cSld>
     <p:spTree>
@@ -4685,95 +4995,6 @@
 </p:sld>
 </file>
 
-<file path=ppt/slides/slide8.xml><?xml version="1.0" encoding="utf-8"?>
-<p:sld xmlns:a="http://schemas.openxmlformats.org/drawingml/2006/main" xmlns:r="http://schemas.openxmlformats.org/officeDocument/2006/relationships" xmlns:p="http://schemas.openxmlformats.org/presentationml/2006/main">
-  <p:cSld>
-    <p:spTree>
-      <p:nvGrpSpPr>
-        <p:cNvPr id="1" name=""/>
-        <p:cNvGrpSpPr/>
-        <p:nvPr/>
-      </p:nvGrpSpPr>
-      <p:grpSpPr>
-        <a:xfrm>
-          <a:off x="0" y="0"/>
-          <a:ext cx="0" cy="0"/>
-          <a:chOff x="0" y="0"/>
-          <a:chExt cx="0" cy="0"/>
-        </a:xfrm>
-      </p:grpSpPr>
-      <p:sp>
-        <p:nvSpPr>
-          <p:cNvPr id="2" name="Title 1"/>
-          <p:cNvSpPr>
-            <a:spLocks noGrp="1"/>
-          </p:cNvSpPr>
-          <p:nvPr>
-            <p:ph type="title"/>
-          </p:nvPr>
-        </p:nvSpPr>
-        <p:spPr/>
-        <p:txBody>
-          <a:bodyPr/>
-          <a:lstStyle/>
-          <a:p>
-            <a:r>
-              <a:rPr lang="en-US" dirty="0" smtClean="0"/>
-              <a:t>Other Considerations</a:t>
-            </a:r>
-            <a:endParaRPr lang="en-US" dirty="0"/>
-          </a:p>
-        </p:txBody>
-      </p:sp>
-      <p:sp>
-        <p:nvSpPr>
-          <p:cNvPr id="3" name="Content Placeholder 2"/>
-          <p:cNvSpPr>
-            <a:spLocks noGrp="1"/>
-          </p:cNvSpPr>
-          <p:nvPr>
-            <p:ph idx="1"/>
-          </p:nvPr>
-        </p:nvSpPr>
-        <p:spPr/>
-        <p:txBody>
-          <a:bodyPr/>
-          <a:lstStyle/>
-          <a:p>
-            <a:r>
-              <a:rPr lang="en-US" dirty="0" smtClean="0"/>
-              <a:t>Should take into account negation </a:t>
-            </a:r>
-          </a:p>
-          <a:p>
-            <a:pPr lvl="1"/>
-            <a:r>
-              <a:rPr lang="en-US" dirty="0" smtClean="0"/>
-              <a:t>Scan for negation terms and adjust score appropriately</a:t>
-            </a:r>
-          </a:p>
-          <a:p>
-            <a:r>
-              <a:rPr lang="en-US" dirty="0" smtClean="0"/>
-              <a:t>Oblivious to sarcasm</a:t>
-            </a:r>
-            <a:endParaRPr lang="en-US" dirty="0"/>
-          </a:p>
-        </p:txBody>
-      </p:sp>
-    </p:spTree>
-    <p:extLst>
-      <p:ext uri="{BB962C8B-B14F-4D97-AF65-F5344CB8AC3E}">
-        <p14:creationId xmlns:p14="http://schemas.microsoft.com/office/powerpoint/2010/main" val="3693672740"/>
-      </p:ext>
-    </p:extLst>
-  </p:cSld>
-  <p:clrMapOvr>
-    <a:masterClrMapping/>
-  </p:clrMapOvr>
-</p:sld>
-</file>
-
 <file path=ppt/slides/slide9.xml><?xml version="1.0" encoding="utf-8"?>
 <p:sld xmlns:a="http://schemas.openxmlformats.org/drawingml/2006/main" xmlns:r="http://schemas.openxmlformats.org/officeDocument/2006/relationships" xmlns:p="http://schemas.openxmlformats.org/presentationml/2006/main">
   <p:cSld>
@@ -4808,7 +5029,7 @@
           <a:p>
             <a:r>
               <a:rPr lang="en-US" dirty="0" smtClean="0"/>
-              <a:t>Sentiment and Geography</a:t>
+              <a:t>Other Considerations</a:t>
             </a:r>
             <a:endParaRPr lang="en-US" dirty="0"/>
           </a:p>
@@ -4829,14 +5050,60 @@
           <a:bodyPr/>
           <a:lstStyle/>
           <a:p>
-            <a:endParaRPr lang="en-US"/>
+            <a:r>
+              <a:rPr lang="en-US" dirty="0" smtClean="0"/>
+              <a:t>Should take into account negation </a:t>
+            </a:r>
+          </a:p>
+          <a:p>
+            <a:pPr lvl="1"/>
+            <a:r>
+              <a:rPr lang="en-US" dirty="0" smtClean="0"/>
+              <a:t>Scan for negation terms and adjust score </a:t>
+            </a:r>
+            <a:r>
+              <a:rPr lang="en-US" dirty="0" smtClean="0"/>
+              <a:t>appropriately</a:t>
+            </a:r>
+          </a:p>
+          <a:p>
+            <a:r>
+              <a:rPr lang="en-US" dirty="0" smtClean="0"/>
+              <a:t>Oblivious </a:t>
+            </a:r>
+            <a:r>
+              <a:rPr lang="en-US" dirty="0" smtClean="0"/>
+              <a:t>to </a:t>
+            </a:r>
+            <a:r>
+              <a:rPr lang="en-US" dirty="0" smtClean="0"/>
+              <a:t>sarcasm</a:t>
+            </a:r>
+          </a:p>
+          <a:p>
+            <a:r>
+              <a:rPr lang="en-US" dirty="0"/>
+              <a:t>Sentiment scores should probably be modified by context</a:t>
+            </a:r>
+          </a:p>
+          <a:p>
+            <a:pPr lvl="1"/>
+            <a:r>
+              <a:rPr lang="en-US" dirty="0" smtClean="0"/>
+              <a:t>ML methods will be sensitive to the nature of the </a:t>
+            </a:r>
+            <a:r>
+              <a:rPr lang="en-US" smtClean="0"/>
+              <a:t>corpora employed</a:t>
+            </a:r>
+            <a:endParaRPr lang="en-US" dirty="0"/>
           </a:p>
         </p:txBody>
       </p:sp>
     </p:spTree>
     <p:extLst>
       <p:ext uri="{BB962C8B-B14F-4D97-AF65-F5344CB8AC3E}">
-        <p14:creationId xmlns:p14="http://schemas.microsoft.com/office/powerpoint/2010/main" val="2467920415"/>
+        <p14:creationId xmlns:p14="http://schemas.microsoft.com/office/powerpoint/2010/main" val="3693672740"/>
       </p:ext>
     </p:extLst>
   </p:cSld>

</xml_diff>

<commit_message>
Some more visualizations. More or less finished the slides. Added note on data availability
</commit_message>
<xml_diff>
--- a/ctrug.pptx
+++ b/ctrug.pptx
@@ -5,19 +5,22 @@
     <p:sldMasterId id="2147483648" r:id="rId1"/>
   </p:sldMasterIdLst>
   <p:notesMasterIdLst>
-    <p:notesMasterId r:id="rId12"/>
+    <p:notesMasterId r:id="rId15"/>
   </p:notesMasterIdLst>
   <p:sldIdLst>
     <p:sldId id="256" r:id="rId2"/>
     <p:sldId id="266" r:id="rId3"/>
     <p:sldId id="257" r:id="rId4"/>
-    <p:sldId id="259" r:id="rId5"/>
-    <p:sldId id="261" r:id="rId6"/>
-    <p:sldId id="262" r:id="rId7"/>
+    <p:sldId id="270" r:id="rId5"/>
+    <p:sldId id="259" r:id="rId6"/>
+    <p:sldId id="261" r:id="rId7"/>
     <p:sldId id="264" r:id="rId8"/>
     <p:sldId id="265" r:id="rId9"/>
-    <p:sldId id="263" r:id="rId10"/>
-    <p:sldId id="260" r:id="rId11"/>
+    <p:sldId id="267" r:id="rId10"/>
+    <p:sldId id="268" r:id="rId11"/>
+    <p:sldId id="269" r:id="rId12"/>
+    <p:sldId id="260" r:id="rId13"/>
+    <p:sldId id="263" r:id="rId14"/>
   </p:sldIdLst>
   <p:sldSz cx="9144000" cy="6858000" type="screen4x3"/>
   <p:notesSz cx="6858000" cy="9144000"/>
@@ -534,7 +537,7 @@
           <a:p>
             <a:fld id="{EDF527AC-2892-4C4B-B46F-80830B5ED1D2}" type="slidenum">
               <a:rPr lang="en-US" smtClean="0"/>
-              <a:t>5</a:t>
+              <a:t>6</a:t>
             </a:fld>
             <a:endParaRPr lang="en-US"/>
           </a:p>
@@ -3657,7 +3660,7 @@
           <a:p>
             <a:r>
               <a:rPr lang="en-US" dirty="0" smtClean="0"/>
-              <a:t>Sentiment and Geography</a:t>
+              <a:t>Looking at the Scores</a:t>
             </a:r>
             <a:endParaRPr lang="en-US" dirty="0"/>
           </a:p>
@@ -3665,7 +3668,378 @@
       </p:sp>
       <p:sp>
         <p:nvSpPr>
-          <p:cNvPr id="3" name="Content Placeholder 2"/>
+          <p:cNvPr id="5" name="TextBox 4"/>
+          <p:cNvSpPr txBox="1"/>
+          <p:nvPr/>
+        </p:nvSpPr>
+        <p:spPr>
+          <a:xfrm>
+            <a:off x="138846" y="4729601"/>
+            <a:ext cx="6502100" cy="2062103"/>
+          </a:xfrm>
+          <a:prstGeom prst="rect">
+            <a:avLst/>
+          </a:prstGeom>
+          <a:solidFill>
+            <a:schemeClr val="bg2">
+              <a:lumMod val="90000"/>
+            </a:schemeClr>
+          </a:solidFill>
+          <a:ln>
+            <a:solidFill>
+              <a:schemeClr val="tx1"/>
+            </a:solidFill>
+          </a:ln>
+          <a:effectLst>
+            <a:outerShdw blurRad="50800" dist="38100" dir="2700000" algn="tl" rotWithShape="0">
+              <a:prstClr val="black">
+                <a:alpha val="40000"/>
+              </a:prstClr>
+            </a:outerShdw>
+          </a:effectLst>
+        </p:spPr>
+        <p:txBody>
+          <a:bodyPr wrap="none" rtlCol="0">
+            <a:spAutoFit/>
+          </a:bodyPr>
+          <a:lstStyle/>
+          <a:p>
+            <a:r>
+              <a:rPr lang="en-US" sz="1600" dirty="0" err="1">
+                <a:latin typeface="Consolas"/>
+                <a:cs typeface="Consolas"/>
+              </a:rPr>
+              <a:t>d$swn</a:t>
+            </a:r>
+            <a:r>
+              <a:rPr lang="en-US" sz="1600" dirty="0">
+                <a:latin typeface="Consolas"/>
+                <a:cs typeface="Consolas"/>
+              </a:rPr>
+              <a:t> &lt;- </a:t>
+            </a:r>
+            <a:r>
+              <a:rPr lang="en-US" sz="1600" dirty="0" err="1">
+                <a:latin typeface="Consolas"/>
+                <a:cs typeface="Consolas"/>
+              </a:rPr>
+              <a:t>unlist</a:t>
+            </a:r>
+            <a:r>
+              <a:rPr lang="en-US" sz="1600" dirty="0">
+                <a:latin typeface="Consolas"/>
+                <a:cs typeface="Consolas"/>
+              </a:rPr>
+              <a:t>(</a:t>
+            </a:r>
+            <a:r>
+              <a:rPr lang="en-US" sz="1600" dirty="0" err="1">
+                <a:latin typeface="Consolas"/>
+                <a:cs typeface="Consolas"/>
+              </a:rPr>
+              <a:t>scores.swn</a:t>
+            </a:r>
+            <a:r>
+              <a:rPr lang="en-US" sz="1600" dirty="0">
+                <a:latin typeface="Consolas"/>
+                <a:cs typeface="Consolas"/>
+              </a:rPr>
+              <a:t>)</a:t>
+            </a:r>
+          </a:p>
+          <a:p>
+            <a:r>
+              <a:rPr lang="en-US" sz="1600" dirty="0" err="1">
+                <a:latin typeface="Consolas"/>
+                <a:cs typeface="Consolas"/>
+              </a:rPr>
+              <a:t>d$breen</a:t>
+            </a:r>
+            <a:r>
+              <a:rPr lang="en-US" sz="1600" dirty="0">
+                <a:latin typeface="Consolas"/>
+                <a:cs typeface="Consolas"/>
+              </a:rPr>
+              <a:t> &lt;- </a:t>
+            </a:r>
+            <a:r>
+              <a:rPr lang="en-US" sz="1600" dirty="0" err="1">
+                <a:latin typeface="Consolas"/>
+                <a:cs typeface="Consolas"/>
+              </a:rPr>
+              <a:t>unlist</a:t>
+            </a:r>
+            <a:r>
+              <a:rPr lang="en-US" sz="1600" dirty="0">
+                <a:latin typeface="Consolas"/>
+                <a:cs typeface="Consolas"/>
+              </a:rPr>
+              <a:t>(</a:t>
+            </a:r>
+            <a:r>
+              <a:rPr lang="en-US" sz="1600" dirty="0" err="1">
+                <a:latin typeface="Consolas"/>
+                <a:cs typeface="Consolas"/>
+              </a:rPr>
+              <a:t>scores.breen</a:t>
+            </a:r>
+            <a:r>
+              <a:rPr lang="en-US" sz="1600" dirty="0">
+                <a:latin typeface="Consolas"/>
+                <a:cs typeface="Consolas"/>
+              </a:rPr>
+              <a:t>)</a:t>
+            </a:r>
+          </a:p>
+          <a:p>
+            <a:endParaRPr lang="en-US" sz="1600" dirty="0">
+              <a:latin typeface="Consolas"/>
+              <a:cs typeface="Consolas"/>
+            </a:endParaRPr>
+          </a:p>
+          <a:p>
+            <a:r>
+              <a:rPr lang="en-US" sz="1600" dirty="0" err="1">
+                <a:latin typeface="Consolas"/>
+                <a:cs typeface="Consolas"/>
+              </a:rPr>
+              <a:t>tmp</a:t>
+            </a:r>
+            <a:r>
+              <a:rPr lang="en-US" sz="1600" dirty="0">
+                <a:latin typeface="Consolas"/>
+                <a:cs typeface="Consolas"/>
+              </a:rPr>
+              <a:t> &lt;- </a:t>
+            </a:r>
+            <a:r>
+              <a:rPr lang="en-US" sz="1600" dirty="0" err="1">
+                <a:latin typeface="Consolas"/>
+                <a:cs typeface="Consolas"/>
+              </a:rPr>
+              <a:t>rbind</a:t>
+            </a:r>
+            <a:r>
+              <a:rPr lang="en-US" sz="1600" dirty="0">
+                <a:latin typeface="Consolas"/>
+                <a:cs typeface="Consolas"/>
+              </a:rPr>
+              <a:t>(</a:t>
+            </a:r>
+            <a:r>
+              <a:rPr lang="en-US" sz="1600" dirty="0" err="1">
+                <a:latin typeface="Consolas"/>
+                <a:cs typeface="Consolas"/>
+              </a:rPr>
+              <a:t>data.frame</a:t>
+            </a:r>
+            <a:r>
+              <a:rPr lang="en-US" sz="1600" dirty="0">
+                <a:latin typeface="Consolas"/>
+                <a:cs typeface="Consolas"/>
+              </a:rPr>
+              <a:t>(Method='SWN', Scores=</a:t>
+            </a:r>
+            <a:r>
+              <a:rPr lang="en-US" sz="1600" dirty="0" err="1">
+                <a:latin typeface="Consolas"/>
+                <a:cs typeface="Consolas"/>
+              </a:rPr>
+              <a:t>d$swn</a:t>
+            </a:r>
+            <a:r>
+              <a:rPr lang="en-US" sz="1600" dirty="0">
+                <a:latin typeface="Consolas"/>
+                <a:cs typeface="Consolas"/>
+              </a:rPr>
+              <a:t>),</a:t>
+            </a:r>
+          </a:p>
+          <a:p>
+            <a:r>
+              <a:rPr lang="en-US" sz="1600" dirty="0">
+                <a:latin typeface="Consolas"/>
+                <a:cs typeface="Consolas"/>
+              </a:rPr>
+              <a:t>             </a:t>
+            </a:r>
+            <a:r>
+              <a:rPr lang="en-US" sz="1600" dirty="0" err="1">
+                <a:latin typeface="Consolas"/>
+                <a:cs typeface="Consolas"/>
+              </a:rPr>
+              <a:t>data.frame</a:t>
+            </a:r>
+            <a:r>
+              <a:rPr lang="en-US" sz="1600" dirty="0">
+                <a:latin typeface="Consolas"/>
+                <a:cs typeface="Consolas"/>
+              </a:rPr>
+              <a:t>(Method='Breen', Scores=</a:t>
+            </a:r>
+            <a:r>
+              <a:rPr lang="en-US" sz="1600" dirty="0" err="1">
+                <a:latin typeface="Consolas"/>
+                <a:cs typeface="Consolas"/>
+              </a:rPr>
+              <a:t>d$breen</a:t>
+            </a:r>
+            <a:r>
+              <a:rPr lang="en-US" sz="1600" dirty="0">
+                <a:latin typeface="Consolas"/>
+                <a:cs typeface="Consolas"/>
+              </a:rPr>
+              <a:t>))</a:t>
+            </a:r>
+          </a:p>
+          <a:p>
+            <a:r>
+              <a:rPr lang="en-US" sz="1600" dirty="0" err="1">
+                <a:latin typeface="Consolas"/>
+                <a:cs typeface="Consolas"/>
+              </a:rPr>
+              <a:t>ggplot</a:t>
+            </a:r>
+            <a:r>
+              <a:rPr lang="en-US" sz="1600" dirty="0">
+                <a:latin typeface="Consolas"/>
+                <a:cs typeface="Consolas"/>
+              </a:rPr>
+              <a:t>(</a:t>
+            </a:r>
+            <a:r>
+              <a:rPr lang="en-US" sz="1600" dirty="0" err="1">
+                <a:latin typeface="Consolas"/>
+                <a:cs typeface="Consolas"/>
+              </a:rPr>
+              <a:t>tmp</a:t>
+            </a:r>
+            <a:r>
+              <a:rPr lang="en-US" sz="1600" dirty="0">
+                <a:latin typeface="Consolas"/>
+                <a:cs typeface="Consolas"/>
+              </a:rPr>
+              <a:t>, </a:t>
+            </a:r>
+            <a:r>
+              <a:rPr lang="en-US" sz="1600" dirty="0" err="1">
+                <a:latin typeface="Consolas"/>
+                <a:cs typeface="Consolas"/>
+              </a:rPr>
+              <a:t>aes</a:t>
+            </a:r>
+            <a:r>
+              <a:rPr lang="en-US" sz="1600" dirty="0">
+                <a:latin typeface="Consolas"/>
+                <a:cs typeface="Consolas"/>
+              </a:rPr>
+              <a:t>(x=Scores, fill=Method)</a:t>
+            </a:r>
+            <a:r>
+              <a:rPr lang="en-US" sz="1600" dirty="0" smtClean="0">
+                <a:latin typeface="Consolas"/>
+                <a:cs typeface="Consolas"/>
+              </a:rPr>
+              <a:t>) +</a:t>
+            </a:r>
+          </a:p>
+          <a:p>
+            <a:r>
+              <a:rPr lang="en-US" sz="1600" dirty="0">
+                <a:latin typeface="Consolas"/>
+                <a:cs typeface="Consolas"/>
+              </a:rPr>
+              <a:t> </a:t>
+            </a:r>
+            <a:r>
+              <a:rPr lang="en-US" sz="1600" dirty="0" smtClean="0">
+                <a:latin typeface="Consolas"/>
+                <a:cs typeface="Consolas"/>
+              </a:rPr>
+              <a:t> </a:t>
+            </a:r>
+            <a:r>
+              <a:rPr lang="en-US" sz="1600" dirty="0" err="1" smtClean="0">
+                <a:latin typeface="Consolas"/>
+                <a:cs typeface="Consolas"/>
+              </a:rPr>
+              <a:t>geom_density</a:t>
+            </a:r>
+            <a:r>
+              <a:rPr lang="en-US" sz="1600" dirty="0">
+                <a:latin typeface="Consolas"/>
+                <a:cs typeface="Consolas"/>
+              </a:rPr>
+              <a:t>(alpha=0.25</a:t>
+            </a:r>
+            <a:r>
+              <a:rPr lang="en-US" sz="1600" dirty="0" smtClean="0">
+                <a:latin typeface="Consolas"/>
+                <a:cs typeface="Consolas"/>
+              </a:rPr>
+              <a:t>) +</a:t>
+            </a:r>
+            <a:endParaRPr lang="en-US" sz="1600" dirty="0">
+              <a:latin typeface="Consolas"/>
+              <a:cs typeface="Consolas"/>
+            </a:endParaRPr>
+          </a:p>
+          <a:p>
+            <a:r>
+              <a:rPr lang="en-US" sz="1600" dirty="0">
+                <a:latin typeface="Consolas"/>
+                <a:cs typeface="Consolas"/>
+              </a:rPr>
+              <a:t>  </a:t>
+            </a:r>
+            <a:r>
+              <a:rPr lang="en-US" sz="1600" dirty="0" err="1">
+                <a:latin typeface="Consolas"/>
+                <a:cs typeface="Consolas"/>
+              </a:rPr>
+              <a:t>xlab</a:t>
+            </a:r>
+            <a:r>
+              <a:rPr lang="en-US" sz="1600" dirty="0">
+                <a:latin typeface="Consolas"/>
+                <a:cs typeface="Consolas"/>
+              </a:rPr>
+              <a:t>("Sentiment Scores")</a:t>
+            </a:r>
+            <a:endParaRPr lang="en-US" sz="1600" dirty="0" smtClean="0">
+              <a:latin typeface="Consolas"/>
+              <a:cs typeface="Consolas"/>
+            </a:endParaRPr>
+          </a:p>
+        </p:txBody>
+      </p:sp>
+      <p:pic>
+        <p:nvPicPr>
+          <p:cNvPr id="4" name="Picture 3"/>
+          <p:cNvPicPr>
+            <a:picLocks noChangeAspect="1"/>
+          </p:cNvPicPr>
+          <p:nvPr/>
+        </p:nvPicPr>
+        <p:blipFill>
+          <a:blip r:embed="rId2"/>
+          <a:stretch>
+            <a:fillRect/>
+          </a:stretch>
+        </p:blipFill>
+        <p:spPr>
+          <a:xfrm>
+            <a:off x="3864491" y="1133143"/>
+            <a:ext cx="5279509" cy="3880384"/>
+          </a:xfrm>
+          <a:prstGeom prst="rect">
+            <a:avLst/>
+          </a:prstGeom>
+        </p:spPr>
+      </p:pic>
+      <p:sp>
+        <p:nvSpPr>
+          <p:cNvPr id="6" name="Content Placeholder 2"/>
           <p:cNvSpPr>
             <a:spLocks noGrp="1"/>
           </p:cNvSpPr>
@@ -3673,12 +4047,531 @@
             <p:ph idx="1"/>
           </p:nvPr>
         </p:nvSpPr>
-        <p:spPr/>
+        <p:spPr>
+          <a:xfrm>
+            <a:off x="233075" y="1417638"/>
+            <a:ext cx="8229600" cy="4525963"/>
+          </a:xfrm>
+        </p:spPr>
         <p:txBody>
           <a:bodyPr/>
           <a:lstStyle/>
           <a:p>
-            <a:endParaRPr lang="en-US"/>
+            <a:r>
+              <a:rPr lang="en-US" dirty="0" smtClean="0"/>
+              <a:t>Bulk of the tweets</a:t>
+            </a:r>
+            <a:br>
+              <a:rPr lang="en-US" dirty="0" smtClean="0"/>
+            </a:br>
+            <a:r>
+              <a:rPr lang="en-US" dirty="0" smtClean="0"/>
+              <a:t>are neutral</a:t>
+            </a:r>
+          </a:p>
+          <a:p>
+            <a:r>
+              <a:rPr lang="en-US" dirty="0" smtClean="0"/>
+              <a:t>Similar behavior</a:t>
+            </a:r>
+            <a:br>
+              <a:rPr lang="en-US" dirty="0" smtClean="0"/>
+            </a:br>
+            <a:r>
+              <a:rPr lang="en-US" dirty="0" smtClean="0"/>
+              <a:t>from either </a:t>
+            </a:r>
+            <a:br>
+              <a:rPr lang="en-US" dirty="0" smtClean="0"/>
+            </a:br>
+            <a:r>
+              <a:rPr lang="en-US" dirty="0" smtClean="0"/>
+              <a:t>scoring function</a:t>
+            </a:r>
+            <a:endParaRPr lang="en-US" dirty="0"/>
+          </a:p>
+        </p:txBody>
+      </p:sp>
+    </p:spTree>
+    <p:extLst>
+      <p:ext uri="{BB962C8B-B14F-4D97-AF65-F5344CB8AC3E}">
+        <p14:creationId xmlns:p14="http://schemas.microsoft.com/office/powerpoint/2010/main" val="1854240879"/>
+      </p:ext>
+    </p:extLst>
+  </p:cSld>
+  <p:clrMapOvr>
+    <a:masterClrMapping/>
+  </p:clrMapOvr>
+</p:sld>
+</file>
+
+<file path=ppt/slides/slide11.xml><?xml version="1.0" encoding="utf-8"?>
+<p:sld xmlns:a="http://schemas.openxmlformats.org/drawingml/2006/main" xmlns:r="http://schemas.openxmlformats.org/officeDocument/2006/relationships" xmlns:p="http://schemas.openxmlformats.org/presentationml/2006/main">
+  <p:cSld>
+    <p:spTree>
+      <p:nvGrpSpPr>
+        <p:cNvPr id="1" name=""/>
+        <p:cNvGrpSpPr/>
+        <p:nvPr/>
+      </p:nvGrpSpPr>
+      <p:grpSpPr>
+        <a:xfrm>
+          <a:off x="0" y="0"/>
+          <a:ext cx="0" cy="0"/>
+          <a:chOff x="0" y="0"/>
+          <a:chExt cx="0" cy="0"/>
+        </a:xfrm>
+      </p:grpSpPr>
+      <p:sp>
+        <p:nvSpPr>
+          <p:cNvPr id="2" name="Title 1"/>
+          <p:cNvSpPr>
+            <a:spLocks noGrp="1"/>
+          </p:cNvSpPr>
+          <p:nvPr>
+            <p:ph type="title"/>
+          </p:nvPr>
+        </p:nvSpPr>
+        <p:spPr/>
+        <p:txBody>
+          <a:bodyPr/>
+          <a:lstStyle/>
+          <a:p>
+            <a:r>
+              <a:rPr lang="en-US" dirty="0" smtClean="0"/>
+              <a:t>Contradictions?</a:t>
+            </a:r>
+            <a:endParaRPr lang="en-US" dirty="0"/>
+          </a:p>
+        </p:txBody>
+      </p:sp>
+      <p:sp>
+        <p:nvSpPr>
+          <p:cNvPr id="3" name="Content Placeholder 2"/>
+          <p:cNvSpPr>
+            <a:spLocks noGrp="1"/>
+          </p:cNvSpPr>
+          <p:nvPr>
+            <p:ph idx="1"/>
+          </p:nvPr>
+        </p:nvSpPr>
+        <p:spPr>
+          <a:xfrm>
+            <a:off x="457200" y="1600201"/>
+            <a:ext cx="8229600" cy="1077004"/>
+          </a:xfrm>
+        </p:spPr>
+        <p:txBody>
+          <a:bodyPr/>
+          <a:lstStyle/>
+          <a:p>
+            <a:r>
+              <a:rPr lang="en-US" dirty="0" smtClean="0"/>
+              <a:t>Tweets that are negative according to one score but positive according to another</a:t>
+            </a:r>
+            <a:endParaRPr lang="en-US" dirty="0"/>
+          </a:p>
+        </p:txBody>
+      </p:sp>
+      <p:sp>
+        <p:nvSpPr>
+          <p:cNvPr id="4" name="TextBox 3"/>
+          <p:cNvSpPr txBox="1"/>
+          <p:nvPr/>
+        </p:nvSpPr>
+        <p:spPr>
+          <a:xfrm>
+            <a:off x="2218231" y="3036114"/>
+            <a:ext cx="3681817" cy="338554"/>
+          </a:xfrm>
+          <a:prstGeom prst="rect">
+            <a:avLst/>
+          </a:prstGeom>
+          <a:solidFill>
+            <a:schemeClr val="bg2">
+              <a:lumMod val="90000"/>
+            </a:schemeClr>
+          </a:solidFill>
+          <a:ln>
+            <a:solidFill>
+              <a:schemeClr val="tx1"/>
+            </a:solidFill>
+          </a:ln>
+          <a:effectLst>
+            <a:outerShdw blurRad="50800" dist="38100" dir="2700000" algn="tl" rotWithShape="0">
+              <a:prstClr val="black">
+                <a:alpha val="40000"/>
+              </a:prstClr>
+            </a:outerShdw>
+          </a:effectLst>
+        </p:spPr>
+        <p:txBody>
+          <a:bodyPr wrap="none" rtlCol="0">
+            <a:spAutoFit/>
+          </a:bodyPr>
+          <a:lstStyle/>
+          <a:p>
+            <a:r>
+              <a:rPr lang="en-US" sz="1600" dirty="0">
+                <a:latin typeface="Consolas"/>
+                <a:cs typeface="Consolas"/>
+              </a:rPr>
+              <a:t>subset(d, </a:t>
+            </a:r>
+            <a:r>
+              <a:rPr lang="en-US" sz="1600" dirty="0" err="1">
+                <a:latin typeface="Consolas"/>
+                <a:cs typeface="Consolas"/>
+              </a:rPr>
+              <a:t>swn</a:t>
+            </a:r>
+            <a:r>
+              <a:rPr lang="en-US" sz="1600" dirty="0">
+                <a:latin typeface="Consolas"/>
+                <a:cs typeface="Consolas"/>
+              </a:rPr>
+              <a:t> &lt; -2 &amp; </a:t>
+            </a:r>
+            <a:r>
+              <a:rPr lang="en-US" sz="1600" dirty="0" err="1">
+                <a:latin typeface="Consolas"/>
+                <a:cs typeface="Consolas"/>
+              </a:rPr>
+              <a:t>breen</a:t>
+            </a:r>
+            <a:r>
+              <a:rPr lang="en-US" sz="1600" dirty="0">
+                <a:latin typeface="Consolas"/>
+                <a:cs typeface="Consolas"/>
+              </a:rPr>
+              <a:t> &gt; 1)</a:t>
+            </a:r>
+            <a:endParaRPr lang="en-US" sz="1600" dirty="0" smtClean="0">
+              <a:latin typeface="Consolas"/>
+              <a:cs typeface="Consolas"/>
+            </a:endParaRPr>
+          </a:p>
+        </p:txBody>
+      </p:sp>
+      <p:sp>
+        <p:nvSpPr>
+          <p:cNvPr id="5" name="TextBox 4"/>
+          <p:cNvSpPr txBox="1"/>
+          <p:nvPr/>
+        </p:nvSpPr>
+        <p:spPr>
+          <a:xfrm>
+            <a:off x="0" y="4213045"/>
+            <a:ext cx="9388784" cy="2031325"/>
+          </a:xfrm>
+          <a:prstGeom prst="rect">
+            <a:avLst/>
+          </a:prstGeom>
+          <a:noFill/>
+        </p:spPr>
+        <p:txBody>
+          <a:bodyPr wrap="none" rtlCol="0">
+            <a:spAutoFit/>
+          </a:bodyPr>
+          <a:lstStyle/>
+          <a:p>
+            <a:r>
+              <a:rPr lang="en-US" b="1" i="1" dirty="0"/>
+              <a:t>"</a:t>
+            </a:r>
+            <a:r>
+              <a:rPr lang="en-US" b="1" i="1" dirty="0" err="1"/>
+              <a:t>i</a:t>
+            </a:r>
+            <a:r>
+              <a:rPr lang="en-US" b="1" i="1" dirty="0"/>
+              <a:t> m trying to get some legit food right now like pizza or chicken not this shitty ass school </a:t>
+            </a:r>
+            <a:r>
+              <a:rPr lang="en-US" b="1" i="1" dirty="0" smtClean="0"/>
+              <a:t>lunch”</a:t>
+            </a:r>
+          </a:p>
+          <a:p>
+            <a:endParaRPr lang="en-US" b="1" i="1" dirty="0" smtClean="0"/>
+          </a:p>
+          <a:p>
+            <a:r>
+              <a:rPr lang="en-US" b="1" i="1" dirty="0"/>
+              <a:t>"24 </a:t>
+            </a:r>
+            <a:r>
+              <a:rPr lang="en-US" b="1" i="1" dirty="0" err="1"/>
+              <a:t>i</a:t>
+            </a:r>
+            <a:r>
+              <a:rPr lang="en-US" b="1" i="1" dirty="0"/>
+              <a:t> like reading 25 </a:t>
+            </a:r>
+            <a:r>
+              <a:rPr lang="en-US" b="1" i="1" dirty="0" err="1"/>
+              <a:t>i</a:t>
+            </a:r>
+            <a:r>
+              <a:rPr lang="en-US" b="1" i="1" dirty="0"/>
+              <a:t> hate </a:t>
+            </a:r>
+            <a:r>
+              <a:rPr lang="en-US" b="1" i="1" dirty="0" err="1"/>
+              <a:t>hopsin</a:t>
+            </a:r>
+            <a:r>
+              <a:rPr lang="en-US" b="1" i="1" dirty="0"/>
+              <a:t> 26 </a:t>
+            </a:r>
+            <a:r>
+              <a:rPr lang="en-US" b="1" i="1" dirty="0" err="1"/>
+              <a:t>i</a:t>
+            </a:r>
+            <a:r>
+              <a:rPr lang="en-US" b="1" i="1" dirty="0"/>
+              <a:t> love chips salsa 27 </a:t>
+            </a:r>
+            <a:r>
+              <a:rPr lang="en-US" b="1" i="1" dirty="0" err="1"/>
+              <a:t>i</a:t>
+            </a:r>
+            <a:r>
+              <a:rPr lang="en-US" b="1" i="1" dirty="0"/>
+              <a:t> love </a:t>
+            </a:r>
+            <a:r>
+              <a:rPr lang="en-US" b="1" i="1" dirty="0" err="1"/>
+              <a:t>chevys</a:t>
+            </a:r>
+            <a:r>
+              <a:rPr lang="en-US" b="1" i="1" dirty="0"/>
+              <a:t> 28 </a:t>
+            </a:r>
+            <a:r>
+              <a:rPr lang="en-US" b="1" i="1" dirty="0" err="1"/>
+              <a:t>i</a:t>
+            </a:r>
+            <a:r>
+              <a:rPr lang="en-US" b="1" i="1" dirty="0"/>
+              <a:t> </a:t>
+            </a:r>
+            <a:endParaRPr lang="en-US" b="1" i="1" dirty="0" smtClean="0"/>
+          </a:p>
+          <a:p>
+            <a:r>
+              <a:rPr lang="en-US" b="1" i="1" dirty="0"/>
+              <a:t>	</a:t>
+            </a:r>
+            <a:r>
+              <a:rPr lang="en-US" b="1" i="1" dirty="0" smtClean="0"/>
+              <a:t>was </a:t>
+            </a:r>
+            <a:r>
+              <a:rPr lang="en-US" b="1" i="1" dirty="0"/>
+              <a:t>a thug in middle school 29 </a:t>
+            </a:r>
+            <a:r>
+              <a:rPr lang="en-US" b="1" i="1" dirty="0" err="1"/>
+              <a:t>i</a:t>
+            </a:r>
+            <a:r>
+              <a:rPr lang="en-US" b="1" i="1" dirty="0"/>
+              <a:t> love </a:t>
+            </a:r>
+            <a:r>
+              <a:rPr lang="en-US" b="1" i="1" dirty="0" smtClean="0"/>
+              <a:t>pizza”</a:t>
+            </a:r>
+          </a:p>
+          <a:p>
+            <a:endParaRPr lang="en-US" b="1" i="1" dirty="0" smtClean="0"/>
+          </a:p>
+          <a:p>
+            <a:r>
+              <a:rPr lang="en-US" b="1" i="1" dirty="0"/>
+              <a:t>"@</a:t>
+            </a:r>
+            <a:r>
+              <a:rPr lang="en-US" b="1" i="1" dirty="0" err="1"/>
+              <a:t>naturesempwm</a:t>
+            </a:r>
+            <a:r>
+              <a:rPr lang="en-US" b="1" i="1" dirty="0"/>
+              <a:t> had a raw pizza 4 lunch today but </a:t>
+            </a:r>
+            <a:r>
+              <a:rPr lang="en-US" b="1" i="1" dirty="0" err="1"/>
+              <a:t>i</a:t>
+            </a:r>
+            <a:r>
+              <a:rPr lang="en-US" b="1" i="1" dirty="0"/>
+              <a:t> was not impressed with the dried out </a:t>
+            </a:r>
+            <a:endParaRPr lang="en-US" b="1" i="1" dirty="0" smtClean="0"/>
+          </a:p>
+          <a:p>
+            <a:r>
+              <a:rPr lang="en-US" b="1" i="1" dirty="0"/>
+              <a:t>	</a:t>
+            </a:r>
+            <a:r>
+              <a:rPr lang="en-US" b="1" i="1" dirty="0" smtClean="0"/>
+              <a:t>not </a:t>
+            </a:r>
+            <a:r>
+              <a:rPr lang="en-US" b="1" i="1" dirty="0"/>
+              <a:t>fresh vegetable spring roll </a:t>
+            </a:r>
+            <a:r>
+              <a:rPr lang="en-US" b="1" i="1" dirty="0" err="1"/>
+              <a:t>i</a:t>
+            </a:r>
+            <a:r>
+              <a:rPr lang="en-US" b="1" i="1" dirty="0"/>
+              <a:t> bought threw out "</a:t>
+            </a:r>
+          </a:p>
+        </p:txBody>
+      </p:sp>
+    </p:spTree>
+    <p:extLst>
+      <p:ext uri="{BB962C8B-B14F-4D97-AF65-F5344CB8AC3E}">
+        <p14:creationId xmlns:p14="http://schemas.microsoft.com/office/powerpoint/2010/main" val="4217808797"/>
+      </p:ext>
+    </p:extLst>
+  </p:cSld>
+  <p:clrMapOvr>
+    <a:masterClrMapping/>
+  </p:clrMapOvr>
+</p:sld>
+</file>
+
+<file path=ppt/slides/slide12.xml><?xml version="1.0" encoding="utf-8"?>
+<p:sld xmlns:a="http://schemas.openxmlformats.org/drawingml/2006/main" xmlns:r="http://schemas.openxmlformats.org/officeDocument/2006/relationships" xmlns:p="http://schemas.openxmlformats.org/presentationml/2006/main">
+  <p:cSld>
+    <p:spTree>
+      <p:nvGrpSpPr>
+        <p:cNvPr id="1" name=""/>
+        <p:cNvGrpSpPr/>
+        <p:nvPr/>
+      </p:nvGrpSpPr>
+      <p:grpSpPr>
+        <a:xfrm>
+          <a:off x="0" y="0"/>
+          <a:ext cx="0" cy="0"/>
+          <a:chOff x="0" y="0"/>
+          <a:chExt cx="0" cy="0"/>
+        </a:xfrm>
+      </p:grpSpPr>
+      <p:pic>
+        <p:nvPicPr>
+          <p:cNvPr id="5" name="Picture 4"/>
+          <p:cNvPicPr>
+            <a:picLocks noChangeAspect="1"/>
+          </p:cNvPicPr>
+          <p:nvPr/>
+        </p:nvPicPr>
+        <p:blipFill>
+          <a:blip r:embed="rId2"/>
+          <a:stretch>
+            <a:fillRect/>
+          </a:stretch>
+        </p:blipFill>
+        <p:spPr>
+          <a:xfrm>
+            <a:off x="3635810" y="3725404"/>
+            <a:ext cx="5508190" cy="3144563"/>
+          </a:xfrm>
+          <a:prstGeom prst="rect">
+            <a:avLst/>
+          </a:prstGeom>
+        </p:spPr>
+      </p:pic>
+      <p:sp>
+        <p:nvSpPr>
+          <p:cNvPr id="2" name="Title 1"/>
+          <p:cNvSpPr>
+            <a:spLocks noGrp="1"/>
+          </p:cNvSpPr>
+          <p:nvPr>
+            <p:ph type="title"/>
+          </p:nvPr>
+        </p:nvSpPr>
+        <p:spPr/>
+        <p:txBody>
+          <a:bodyPr/>
+          <a:lstStyle/>
+          <a:p>
+            <a:r>
+              <a:rPr lang="en-US" dirty="0" smtClean="0"/>
+              <a:t>Sentiment and Geography</a:t>
+            </a:r>
+            <a:endParaRPr lang="en-US" dirty="0"/>
+          </a:p>
+        </p:txBody>
+      </p:sp>
+      <p:sp>
+        <p:nvSpPr>
+          <p:cNvPr id="3" name="Content Placeholder 2"/>
+          <p:cNvSpPr>
+            <a:spLocks noGrp="1"/>
+          </p:cNvSpPr>
+          <p:nvPr>
+            <p:ph idx="1"/>
+          </p:nvPr>
+        </p:nvSpPr>
+        <p:spPr/>
+        <p:txBody>
+          <a:bodyPr/>
+          <a:lstStyle/>
+          <a:p>
+            <a:r>
+              <a:rPr lang="en-US" dirty="0" smtClean="0"/>
+              <a:t>What’s the spatial distribution of tweet sentiment?</a:t>
+            </a:r>
+          </a:p>
+          <a:p>
+            <a:r>
+              <a:rPr lang="en-US" dirty="0" smtClean="0"/>
+              <a:t>Extract tweets located in the CONUS (~ 500)</a:t>
+            </a:r>
+          </a:p>
+          <a:p>
+            <a:r>
+              <a:rPr lang="en-US" dirty="0" smtClean="0"/>
+              <a:t>Visualize the direction and strength of</a:t>
+            </a:r>
+            <a:br>
+              <a:rPr lang="en-US" dirty="0" smtClean="0"/>
+            </a:br>
+            <a:r>
+              <a:rPr lang="en-US" dirty="0" smtClean="0"/>
+              <a:t>sentiments</a:t>
+            </a:r>
+          </a:p>
+          <a:p>
+            <a:r>
+              <a:rPr lang="en-US" dirty="0" smtClean="0"/>
+              <a:t>Correlate with</a:t>
+            </a:r>
+            <a:br>
+              <a:rPr lang="en-US" dirty="0" smtClean="0"/>
+            </a:br>
+            <a:r>
+              <a:rPr lang="en-US" dirty="0" smtClean="0"/>
+              <a:t>other socio-</a:t>
+            </a:r>
+            <a:br>
+              <a:rPr lang="en-US" dirty="0" smtClean="0"/>
+            </a:br>
+            <a:r>
+              <a:rPr lang="en-US" dirty="0" smtClean="0"/>
+              <a:t>economic factors?</a:t>
+            </a:r>
+          </a:p>
+          <a:p>
+            <a:endParaRPr lang="en-US" dirty="0"/>
           </a:p>
         </p:txBody>
       </p:sp>
@@ -3686,6 +4579,112 @@
     <p:extLst>
       <p:ext uri="{BB962C8B-B14F-4D97-AF65-F5344CB8AC3E}">
         <p14:creationId xmlns:p14="http://schemas.microsoft.com/office/powerpoint/2010/main" val="2467920415"/>
+      </p:ext>
+    </p:extLst>
+  </p:cSld>
+  <p:clrMapOvr>
+    <a:masterClrMapping/>
+  </p:clrMapOvr>
+</p:sld>
+</file>
+
+<file path=ppt/slides/slide13.xml><?xml version="1.0" encoding="utf-8"?>
+<p:sld xmlns:a="http://schemas.openxmlformats.org/drawingml/2006/main" xmlns:r="http://schemas.openxmlformats.org/officeDocument/2006/relationships" xmlns:p="http://schemas.openxmlformats.org/presentationml/2006/main">
+  <p:cSld>
+    <p:spTree>
+      <p:nvGrpSpPr>
+        <p:cNvPr id="1" name=""/>
+        <p:cNvGrpSpPr/>
+        <p:nvPr/>
+      </p:nvGrpSpPr>
+      <p:grpSpPr>
+        <a:xfrm>
+          <a:off x="0" y="0"/>
+          <a:ext cx="0" cy="0"/>
+          <a:chOff x="0" y="0"/>
+          <a:chExt cx="0" cy="0"/>
+        </a:xfrm>
+      </p:grpSpPr>
+      <p:sp>
+        <p:nvSpPr>
+          <p:cNvPr id="2" name="Title 1"/>
+          <p:cNvSpPr>
+            <a:spLocks noGrp="1"/>
+          </p:cNvSpPr>
+          <p:nvPr>
+            <p:ph type="title"/>
+          </p:nvPr>
+        </p:nvSpPr>
+        <p:spPr/>
+        <p:txBody>
+          <a:bodyPr/>
+          <a:lstStyle/>
+          <a:p>
+            <a:r>
+              <a:rPr lang="en-US" dirty="0" smtClean="0"/>
+              <a:t>Other Considerations</a:t>
+            </a:r>
+            <a:endParaRPr lang="en-US" dirty="0"/>
+          </a:p>
+        </p:txBody>
+      </p:sp>
+      <p:sp>
+        <p:nvSpPr>
+          <p:cNvPr id="3" name="Content Placeholder 2"/>
+          <p:cNvSpPr>
+            <a:spLocks noGrp="1"/>
+          </p:cNvSpPr>
+          <p:nvPr>
+            <p:ph idx="1"/>
+          </p:nvPr>
+        </p:nvSpPr>
+        <p:spPr/>
+        <p:txBody>
+          <a:bodyPr/>
+          <a:lstStyle/>
+          <a:p>
+            <a:r>
+              <a:rPr lang="en-US" dirty="0" smtClean="0"/>
+              <a:t>Should take into account negation </a:t>
+            </a:r>
+          </a:p>
+          <a:p>
+            <a:pPr lvl="1"/>
+            <a:r>
+              <a:rPr lang="en-US" dirty="0" smtClean="0"/>
+              <a:t>Scan for negation terms and adjust score appropriately</a:t>
+            </a:r>
+          </a:p>
+          <a:p>
+            <a:r>
+              <a:rPr lang="en-US" dirty="0" smtClean="0"/>
+              <a:t>Oblivious to sarcasm</a:t>
+            </a:r>
+          </a:p>
+          <a:p>
+            <a:r>
+              <a:rPr lang="en-US" dirty="0"/>
+              <a:t>Sentiment scores should probably be modified by context</a:t>
+            </a:r>
+          </a:p>
+          <a:p>
+            <a:pPr lvl="1"/>
+            <a:r>
+              <a:rPr lang="en-US" dirty="0" smtClean="0"/>
+              <a:t>ML methods will be sensitive to the nature of the </a:t>
+            </a:r>
+            <a:r>
+              <a:rPr lang="en-US" smtClean="0"/>
+              <a:t>corpora employed</a:t>
+            </a:r>
+            <a:endParaRPr lang="en-US" dirty="0"/>
+          </a:p>
+        </p:txBody>
+      </p:sp>
+    </p:spTree>
+    <p:extLst>
+      <p:ext uri="{BB962C8B-B14F-4D97-AF65-F5344CB8AC3E}">
+        <p14:creationId xmlns:p14="http://schemas.microsoft.com/office/powerpoint/2010/main" val="3693672740"/>
       </p:ext>
     </p:extLst>
   </p:cSld>
@@ -3848,37 +4847,77 @@
             <p:ph idx="1"/>
           </p:nvPr>
         </p:nvSpPr>
-        <p:spPr/>
-        <p:txBody>
-          <a:bodyPr/>
+        <p:spPr>
+          <a:xfrm>
+            <a:off x="273931" y="1600200"/>
+            <a:ext cx="8616371" cy="4525963"/>
+          </a:xfrm>
+        </p:spPr>
+        <p:txBody>
+          <a:bodyPr>
+            <a:normAutofit/>
+          </a:bodyPr>
           <a:lstStyle/>
           <a:p>
             <a:r>
               <a:rPr lang="en-US" dirty="0" smtClean="0"/>
-              <a:t>Accessing Twitter is relatively easy using many languages</a:t>
+              <a:t>Accessing Twitter is </a:t>
+            </a:r>
+            <a:r>
+              <a:rPr lang="en-US" dirty="0" smtClean="0"/>
+              <a:t>easy </a:t>
+            </a:r>
+            <a:r>
+              <a:rPr lang="en-US" dirty="0" smtClean="0"/>
+              <a:t>using many languages</a:t>
             </a:r>
           </a:p>
           <a:p>
             <a:pPr lvl="1"/>
             <a:r>
               <a:rPr lang="en-US" dirty="0" smtClean="0"/>
-              <a:t>We obtained tweets via a PHP client running over an extended period of time</a:t>
-            </a:r>
-          </a:p>
-          <a:p>
-            <a:r>
-              <a:rPr lang="en-US" dirty="0" smtClean="0"/>
-              <a:t>Won’t focus on accessing Twitter data from within R</a:t>
+              <a:t>We obtained tweets via a PHP client running over an extended period of </a:t>
+            </a:r>
+            <a:r>
+              <a:rPr lang="en-US" dirty="0" smtClean="0"/>
+              <a:t>time</a:t>
             </a:r>
           </a:p>
           <a:p>
             <a:pPr lvl="1"/>
             <a:r>
+              <a:rPr lang="en-US" dirty="0">
+                <a:cs typeface="Consolas"/>
+              </a:rPr>
+              <a:t>Ended up with 108,164 </a:t>
+            </a:r>
+            <a:r>
+              <a:rPr lang="en-US" dirty="0" smtClean="0">
+                <a:cs typeface="Consolas"/>
+              </a:rPr>
+              <a:t>tweets</a:t>
+            </a:r>
+            <a:endParaRPr lang="en-US" dirty="0" smtClean="0"/>
+          </a:p>
+          <a:p>
+            <a:r>
+              <a:rPr lang="en-US" dirty="0" smtClean="0"/>
+              <a:t>Won’t focus on accessing Twitter data </a:t>
+            </a:r>
+            <a:r>
+              <a:rPr lang="en-US" dirty="0" smtClean="0"/>
+              <a:t>from R</a:t>
+            </a:r>
+            <a:endParaRPr lang="en-US" dirty="0" smtClean="0"/>
+          </a:p>
+          <a:p>
+            <a:pPr lvl="1"/>
+            <a:r>
               <a:rPr lang="en-US" dirty="0" smtClean="0"/>
               <a:t>Very straightforward with </a:t>
             </a:r>
             <a:r>
-              <a:rPr lang="en-US" b="1" dirty="0" err="1" smtClean="0">
+              <a:rPr lang="en-US" b="1" dirty="0" smtClean="0">
                 <a:latin typeface="Consolas"/>
                 <a:cs typeface="Consolas"/>
                 <a:hlinkClick r:id="rId2"/>
@@ -3939,7 +4978,7 @@
           <a:p>
             <a:r>
               <a:rPr lang="en-US" dirty="0" smtClean="0"/>
-              <a:t>Quantifying Sentiment</a:t>
+              <a:t>Cleaning Text</a:t>
             </a:r>
             <a:endParaRPr lang="en-US" dirty="0"/>
           </a:p>
@@ -3962,33 +5001,665 @@
           <a:p>
             <a:r>
               <a:rPr lang="en-US" dirty="0" smtClean="0"/>
-              <a:t>Based on identifying words with positive or negative connotations</a:t>
-            </a:r>
-          </a:p>
-          <a:p>
-            <a:r>
-              <a:rPr lang="en-US" dirty="0" smtClean="0"/>
-              <a:t>Fundamentally based on looking up words from a dictionary</a:t>
-            </a:r>
-          </a:p>
-          <a:p>
-            <a:r>
-              <a:rPr lang="en-US" dirty="0" smtClean="0"/>
-              <a:t>If a tweet has more positive words than negative words, the tweet is positive</a:t>
-            </a:r>
-          </a:p>
-          <a:p>
-            <a:r>
-              <a:rPr lang="en-US" dirty="0" smtClean="0"/>
-              <a:t>More sophisticated scoring schemes are possible</a:t>
-            </a:r>
+              <a:t>Load in tweet data, get rid of </a:t>
+            </a:r>
+            <a:r>
+              <a:rPr lang="en-US" dirty="0" err="1" smtClean="0"/>
+              <a:t>urls</a:t>
+            </a:r>
+            <a:r>
+              <a:rPr lang="en-US" dirty="0" smtClean="0"/>
+              <a:t>, HTML escape codes and </a:t>
+            </a:r>
+            <a:r>
+              <a:rPr lang="en-US" dirty="0" err="1" smtClean="0"/>
+              <a:t>misc</a:t>
+            </a:r>
+            <a:r>
+              <a:rPr lang="en-US" dirty="0" smtClean="0"/>
+              <a:t> items</a:t>
+            </a:r>
+          </a:p>
+          <a:p>
+            <a:endParaRPr lang="en-US" dirty="0"/>
+          </a:p>
+        </p:txBody>
+      </p:sp>
+      <p:sp>
+        <p:nvSpPr>
+          <p:cNvPr id="4" name="TextBox 3"/>
+          <p:cNvSpPr txBox="1"/>
+          <p:nvPr/>
+        </p:nvSpPr>
+        <p:spPr>
+          <a:xfrm>
+            <a:off x="393700" y="2873911"/>
+            <a:ext cx="8419893" cy="3785652"/>
+          </a:xfrm>
+          <a:prstGeom prst="rect">
+            <a:avLst/>
+          </a:prstGeom>
+          <a:solidFill>
+            <a:schemeClr val="bg2">
+              <a:lumMod val="90000"/>
+            </a:schemeClr>
+          </a:solidFill>
+          <a:ln>
+            <a:solidFill>
+              <a:schemeClr val="tx1"/>
+            </a:solidFill>
+          </a:ln>
+          <a:effectLst>
+            <a:outerShdw blurRad="50800" dist="38100" dir="2700000" algn="tl" rotWithShape="0">
+              <a:prstClr val="black">
+                <a:alpha val="40000"/>
+              </a:prstClr>
+            </a:outerShdw>
+          </a:effectLst>
+        </p:spPr>
+        <p:txBody>
+          <a:bodyPr wrap="none" rtlCol="0">
+            <a:spAutoFit/>
+          </a:bodyPr>
+          <a:lstStyle/>
+          <a:p>
+            <a:r>
+              <a:rPr lang="en-US" sz="1600" dirty="0">
+                <a:latin typeface="Consolas"/>
+                <a:cs typeface="Consolas"/>
+              </a:rPr>
+              <a:t>d &lt;- </a:t>
+            </a:r>
+            <a:r>
+              <a:rPr lang="en-US" sz="1600" dirty="0" err="1">
+                <a:latin typeface="Consolas"/>
+                <a:cs typeface="Consolas"/>
+              </a:rPr>
+              <a:t>read.csv</a:t>
+            </a:r>
+            <a:r>
+              <a:rPr lang="en-US" sz="1600" dirty="0">
+                <a:latin typeface="Consolas"/>
+                <a:cs typeface="Consolas"/>
+              </a:rPr>
+              <a:t>('pizza-</a:t>
+            </a:r>
+            <a:r>
+              <a:rPr lang="en-US" sz="1600" dirty="0" err="1">
+                <a:latin typeface="Consolas"/>
+                <a:cs typeface="Consolas"/>
+              </a:rPr>
+              <a:t>unique.csv</a:t>
+            </a:r>
+            <a:r>
+              <a:rPr lang="en-US" sz="1600" dirty="0">
+                <a:latin typeface="Consolas"/>
+                <a:cs typeface="Consolas"/>
+              </a:rPr>
+              <a:t>', </a:t>
+            </a:r>
+            <a:r>
+              <a:rPr lang="en-US" sz="1600" dirty="0" err="1">
+                <a:latin typeface="Consolas"/>
+                <a:cs typeface="Consolas"/>
+              </a:rPr>
+              <a:t>colClass</a:t>
+            </a:r>
+            <a:r>
+              <a:rPr lang="en-US" sz="1600" dirty="0">
+                <a:latin typeface="Consolas"/>
+                <a:cs typeface="Consolas"/>
+              </a:rPr>
+              <a:t>='character', </a:t>
+            </a:r>
+            <a:endParaRPr lang="en-US" sz="1600" dirty="0" smtClean="0">
+              <a:latin typeface="Consolas"/>
+              <a:cs typeface="Consolas"/>
+            </a:endParaRPr>
+          </a:p>
+          <a:p>
+            <a:r>
+              <a:rPr lang="en-US" sz="1600" dirty="0">
+                <a:latin typeface="Consolas"/>
+                <a:cs typeface="Consolas"/>
+              </a:rPr>
+              <a:t> </a:t>
+            </a:r>
+            <a:r>
+              <a:rPr lang="en-US" sz="1600" dirty="0" smtClean="0">
+                <a:latin typeface="Consolas"/>
+                <a:cs typeface="Consolas"/>
+              </a:rPr>
+              <a:t>             comment</a:t>
+            </a:r>
+            <a:r>
+              <a:rPr lang="en-US" sz="1600" dirty="0">
+                <a:latin typeface="Consolas"/>
+                <a:cs typeface="Consolas"/>
+              </a:rPr>
+              <a:t>='', header=TRUE)</a:t>
+            </a:r>
+          </a:p>
+          <a:p>
+            <a:r>
+              <a:rPr lang="en-US" sz="1600" dirty="0" err="1">
+                <a:latin typeface="Consolas"/>
+                <a:cs typeface="Consolas"/>
+              </a:rPr>
+              <a:t>d$geox</a:t>
+            </a:r>
+            <a:r>
+              <a:rPr lang="en-US" sz="1600" dirty="0">
+                <a:latin typeface="Consolas"/>
+                <a:cs typeface="Consolas"/>
+              </a:rPr>
+              <a:t> &lt;- </a:t>
+            </a:r>
+            <a:r>
+              <a:rPr lang="en-US" sz="1600" dirty="0" err="1">
+                <a:latin typeface="Consolas"/>
+                <a:cs typeface="Consolas"/>
+              </a:rPr>
+              <a:t>as.numeric</a:t>
+            </a:r>
+            <a:r>
+              <a:rPr lang="en-US" sz="1600" dirty="0">
+                <a:latin typeface="Consolas"/>
+                <a:cs typeface="Consolas"/>
+              </a:rPr>
+              <a:t>(</a:t>
+            </a:r>
+            <a:r>
+              <a:rPr lang="en-US" sz="1600" dirty="0" err="1">
+                <a:latin typeface="Consolas"/>
+                <a:cs typeface="Consolas"/>
+              </a:rPr>
+              <a:t>d$geox</a:t>
+            </a:r>
+            <a:r>
+              <a:rPr lang="en-US" sz="1600" dirty="0">
+                <a:latin typeface="Consolas"/>
+                <a:cs typeface="Consolas"/>
+              </a:rPr>
+              <a:t>)</a:t>
+            </a:r>
+          </a:p>
+          <a:p>
+            <a:r>
+              <a:rPr lang="en-US" sz="1600" dirty="0" err="1">
+                <a:latin typeface="Consolas"/>
+                <a:cs typeface="Consolas"/>
+              </a:rPr>
+              <a:t>d$geoy</a:t>
+            </a:r>
+            <a:r>
+              <a:rPr lang="en-US" sz="1600" dirty="0">
+                <a:latin typeface="Consolas"/>
+                <a:cs typeface="Consolas"/>
+              </a:rPr>
+              <a:t> &lt;- </a:t>
+            </a:r>
+            <a:r>
+              <a:rPr lang="en-US" sz="1600" dirty="0" err="1">
+                <a:latin typeface="Consolas"/>
+                <a:cs typeface="Consolas"/>
+              </a:rPr>
+              <a:t>as.numeric</a:t>
+            </a:r>
+            <a:r>
+              <a:rPr lang="en-US" sz="1600" dirty="0">
+                <a:latin typeface="Consolas"/>
+                <a:cs typeface="Consolas"/>
+              </a:rPr>
+              <a:t>(</a:t>
+            </a:r>
+            <a:r>
+              <a:rPr lang="en-US" sz="1600" dirty="0" err="1">
+                <a:latin typeface="Consolas"/>
+                <a:cs typeface="Consolas"/>
+              </a:rPr>
+              <a:t>d$geoy</a:t>
+            </a:r>
+            <a:r>
+              <a:rPr lang="en-US" sz="1600" dirty="0">
+                <a:latin typeface="Consolas"/>
+                <a:cs typeface="Consolas"/>
+              </a:rPr>
+              <a:t>)</a:t>
+            </a:r>
+          </a:p>
+          <a:p>
+            <a:endParaRPr lang="en-US" sz="1600" dirty="0">
+              <a:latin typeface="Consolas"/>
+              <a:cs typeface="Consolas"/>
+            </a:endParaRPr>
+          </a:p>
+          <a:p>
+            <a:r>
+              <a:rPr lang="en-US" sz="1600" dirty="0" err="1">
+                <a:latin typeface="Consolas"/>
+                <a:cs typeface="Consolas"/>
+              </a:rPr>
+              <a:t>remove.urls</a:t>
+            </a:r>
+            <a:r>
+              <a:rPr lang="en-US" sz="1600" dirty="0">
+                <a:latin typeface="Consolas"/>
+                <a:cs typeface="Consolas"/>
+              </a:rPr>
+              <a:t> &lt;- function(x) </a:t>
+            </a:r>
+            <a:r>
+              <a:rPr lang="en-US" sz="1600" dirty="0" err="1">
+                <a:latin typeface="Consolas"/>
+                <a:cs typeface="Consolas"/>
+              </a:rPr>
+              <a:t>gsub</a:t>
+            </a:r>
+            <a:r>
+              <a:rPr lang="en-US" sz="1600" dirty="0">
+                <a:latin typeface="Consolas"/>
+                <a:cs typeface="Consolas"/>
+              </a:rPr>
+              <a:t>("http.*$", "", </a:t>
+            </a:r>
+            <a:r>
+              <a:rPr lang="en-US" sz="1600" dirty="0" err="1">
+                <a:latin typeface="Consolas"/>
+                <a:cs typeface="Consolas"/>
+              </a:rPr>
+              <a:t>gsub</a:t>
+            </a:r>
+            <a:r>
+              <a:rPr lang="en-US" sz="1600" dirty="0">
+                <a:latin typeface="Consolas"/>
+                <a:cs typeface="Consolas"/>
+              </a:rPr>
+              <a:t>('http.*\\s', ' ', x))</a:t>
+            </a:r>
+          </a:p>
+          <a:p>
+            <a:r>
+              <a:rPr lang="en-US" sz="1600" dirty="0" err="1">
+                <a:latin typeface="Consolas"/>
+                <a:cs typeface="Consolas"/>
+              </a:rPr>
+              <a:t>remove.html</a:t>
+            </a:r>
+            <a:r>
+              <a:rPr lang="en-US" sz="1600" dirty="0">
+                <a:latin typeface="Consolas"/>
+                <a:cs typeface="Consolas"/>
+              </a:rPr>
+              <a:t> &lt;- function(x) </a:t>
+            </a:r>
+            <a:r>
+              <a:rPr lang="en-US" sz="1600" dirty="0" err="1">
+                <a:latin typeface="Consolas"/>
+                <a:cs typeface="Consolas"/>
+              </a:rPr>
+              <a:t>gsub</a:t>
+            </a:r>
+            <a:r>
+              <a:rPr lang="en-US" sz="1600" dirty="0">
+                <a:latin typeface="Consolas"/>
+                <a:cs typeface="Consolas"/>
+              </a:rPr>
+              <a:t>('&amp;</a:t>
+            </a:r>
+            <a:r>
+              <a:rPr lang="en-US" sz="1600" dirty="0" err="1">
+                <a:latin typeface="Consolas"/>
+                <a:cs typeface="Consolas"/>
+              </a:rPr>
+              <a:t>quot</a:t>
+            </a:r>
+            <a:r>
+              <a:rPr lang="en-US" sz="1600" dirty="0">
+                <a:latin typeface="Consolas"/>
+                <a:cs typeface="Consolas"/>
+              </a:rPr>
+              <a:t>;', '', x)</a:t>
+            </a:r>
+          </a:p>
+          <a:p>
+            <a:endParaRPr lang="en-US" sz="1600" dirty="0">
+              <a:latin typeface="Consolas"/>
+              <a:cs typeface="Consolas"/>
+            </a:endParaRPr>
+          </a:p>
+          <a:p>
+            <a:r>
+              <a:rPr lang="en-US" sz="1600" dirty="0" err="1">
+                <a:latin typeface="Consolas"/>
+                <a:cs typeface="Consolas"/>
+              </a:rPr>
+              <a:t>d$text</a:t>
+            </a:r>
+            <a:r>
+              <a:rPr lang="en-US" sz="1600" dirty="0">
+                <a:latin typeface="Consolas"/>
+                <a:cs typeface="Consolas"/>
+              </a:rPr>
+              <a:t> &lt;- </a:t>
+            </a:r>
+            <a:r>
+              <a:rPr lang="en-US" sz="1600" dirty="0" err="1">
+                <a:latin typeface="Consolas"/>
+                <a:cs typeface="Consolas"/>
+              </a:rPr>
+              <a:t>remove.urls</a:t>
+            </a:r>
+            <a:r>
+              <a:rPr lang="en-US" sz="1600" dirty="0">
+                <a:latin typeface="Consolas"/>
+                <a:cs typeface="Consolas"/>
+              </a:rPr>
+              <a:t>(</a:t>
+            </a:r>
+            <a:r>
+              <a:rPr lang="en-US" sz="1600" dirty="0" err="1">
+                <a:latin typeface="Consolas"/>
+                <a:cs typeface="Consolas"/>
+              </a:rPr>
+              <a:t>d$text</a:t>
+            </a:r>
+            <a:r>
+              <a:rPr lang="en-US" sz="1600" dirty="0">
+                <a:latin typeface="Consolas"/>
+                <a:cs typeface="Consolas"/>
+              </a:rPr>
+              <a:t>)</a:t>
+            </a:r>
+          </a:p>
+          <a:p>
+            <a:r>
+              <a:rPr lang="en-US" sz="1600" dirty="0" err="1">
+                <a:latin typeface="Consolas"/>
+                <a:cs typeface="Consolas"/>
+              </a:rPr>
+              <a:t>d$text</a:t>
+            </a:r>
+            <a:r>
+              <a:rPr lang="en-US" sz="1600" dirty="0">
+                <a:latin typeface="Consolas"/>
+                <a:cs typeface="Consolas"/>
+              </a:rPr>
+              <a:t> &lt;- </a:t>
+            </a:r>
+            <a:r>
+              <a:rPr lang="en-US" sz="1600" dirty="0" err="1">
+                <a:latin typeface="Consolas"/>
+                <a:cs typeface="Consolas"/>
+              </a:rPr>
+              <a:t>remove.html</a:t>
+            </a:r>
+            <a:r>
+              <a:rPr lang="en-US" sz="1600" dirty="0">
+                <a:latin typeface="Consolas"/>
+                <a:cs typeface="Consolas"/>
+              </a:rPr>
+              <a:t>(</a:t>
+            </a:r>
+            <a:r>
+              <a:rPr lang="en-US" sz="1600" dirty="0" err="1">
+                <a:latin typeface="Consolas"/>
+                <a:cs typeface="Consolas"/>
+              </a:rPr>
+              <a:t>d$text</a:t>
+            </a:r>
+            <a:r>
+              <a:rPr lang="en-US" sz="1600" dirty="0">
+                <a:latin typeface="Consolas"/>
+                <a:cs typeface="Consolas"/>
+              </a:rPr>
+              <a:t>)</a:t>
+            </a:r>
+          </a:p>
+          <a:p>
+            <a:r>
+              <a:rPr lang="en-US" sz="1600" dirty="0" err="1">
+                <a:latin typeface="Consolas"/>
+                <a:cs typeface="Consolas"/>
+              </a:rPr>
+              <a:t>d$text</a:t>
+            </a:r>
+            <a:r>
+              <a:rPr lang="en-US" sz="1600" dirty="0">
+                <a:latin typeface="Consolas"/>
+                <a:cs typeface="Consolas"/>
+              </a:rPr>
+              <a:t> &lt;- </a:t>
+            </a:r>
+            <a:r>
+              <a:rPr lang="en-US" sz="1600" dirty="0" err="1">
+                <a:latin typeface="Consolas"/>
+                <a:cs typeface="Consolas"/>
+              </a:rPr>
+              <a:t>gsub</a:t>
+            </a:r>
+            <a:r>
+              <a:rPr lang="en-US" sz="1600" dirty="0">
+                <a:latin typeface="Consolas"/>
+                <a:cs typeface="Consolas"/>
+              </a:rPr>
+              <a:t>("@", "FOOBAZ", </a:t>
+            </a:r>
+            <a:r>
+              <a:rPr lang="en-US" sz="1600" dirty="0" err="1">
+                <a:latin typeface="Consolas"/>
+                <a:cs typeface="Consolas"/>
+              </a:rPr>
+              <a:t>d$text</a:t>
+            </a:r>
+            <a:r>
+              <a:rPr lang="en-US" sz="1600" dirty="0">
+                <a:latin typeface="Consolas"/>
+                <a:cs typeface="Consolas"/>
+              </a:rPr>
+              <a:t>)</a:t>
+            </a:r>
+          </a:p>
+          <a:p>
+            <a:r>
+              <a:rPr lang="en-US" sz="1600" dirty="0" err="1">
+                <a:latin typeface="Consolas"/>
+                <a:cs typeface="Consolas"/>
+              </a:rPr>
+              <a:t>d$text</a:t>
+            </a:r>
+            <a:r>
+              <a:rPr lang="en-US" sz="1600" dirty="0">
+                <a:latin typeface="Consolas"/>
+                <a:cs typeface="Consolas"/>
+              </a:rPr>
+              <a:t> &lt;- </a:t>
+            </a:r>
+            <a:r>
+              <a:rPr lang="en-US" sz="1600" dirty="0" err="1">
+                <a:latin typeface="Consolas"/>
+                <a:cs typeface="Consolas"/>
+              </a:rPr>
+              <a:t>gsub</a:t>
+            </a:r>
+            <a:r>
+              <a:rPr lang="en-US" sz="1600" dirty="0">
+                <a:latin typeface="Consolas"/>
+                <a:cs typeface="Consolas"/>
+              </a:rPr>
+              <a:t>("[[:</a:t>
+            </a:r>
+            <a:r>
+              <a:rPr lang="en-US" sz="1600" dirty="0" err="1">
+                <a:latin typeface="Consolas"/>
+                <a:cs typeface="Consolas"/>
+              </a:rPr>
+              <a:t>punct</a:t>
+            </a:r>
+            <a:r>
+              <a:rPr lang="en-US" sz="1600" dirty="0">
+                <a:latin typeface="Consolas"/>
+                <a:cs typeface="Consolas"/>
+              </a:rPr>
+              <a:t>:]]+", " ", </a:t>
+            </a:r>
+            <a:r>
+              <a:rPr lang="en-US" sz="1600" dirty="0" err="1">
+                <a:latin typeface="Consolas"/>
+                <a:cs typeface="Consolas"/>
+              </a:rPr>
+              <a:t>d$text</a:t>
+            </a:r>
+            <a:r>
+              <a:rPr lang="en-US" sz="1600" dirty="0">
+                <a:latin typeface="Consolas"/>
+                <a:cs typeface="Consolas"/>
+              </a:rPr>
+              <a:t>)</a:t>
+            </a:r>
+          </a:p>
+          <a:p>
+            <a:r>
+              <a:rPr lang="en-US" sz="1600" dirty="0" err="1">
+                <a:latin typeface="Consolas"/>
+                <a:cs typeface="Consolas"/>
+              </a:rPr>
+              <a:t>d$text</a:t>
+            </a:r>
+            <a:r>
+              <a:rPr lang="en-US" sz="1600" dirty="0">
+                <a:latin typeface="Consolas"/>
+                <a:cs typeface="Consolas"/>
+              </a:rPr>
+              <a:t> &lt;- </a:t>
+            </a:r>
+            <a:r>
+              <a:rPr lang="en-US" sz="1600" dirty="0" err="1">
+                <a:latin typeface="Consolas"/>
+                <a:cs typeface="Consolas"/>
+              </a:rPr>
+              <a:t>gsub</a:t>
+            </a:r>
+            <a:r>
+              <a:rPr lang="en-US" sz="1600" dirty="0">
+                <a:latin typeface="Consolas"/>
+                <a:cs typeface="Consolas"/>
+              </a:rPr>
+              <a:t>("FOOBAZ", "@", </a:t>
+            </a:r>
+            <a:r>
+              <a:rPr lang="en-US" sz="1600" dirty="0" err="1">
+                <a:latin typeface="Consolas"/>
+                <a:cs typeface="Consolas"/>
+              </a:rPr>
+              <a:t>d$text</a:t>
+            </a:r>
+            <a:r>
+              <a:rPr lang="en-US" sz="1600" dirty="0">
+                <a:latin typeface="Consolas"/>
+                <a:cs typeface="Consolas"/>
+              </a:rPr>
+              <a:t>)</a:t>
+            </a:r>
+          </a:p>
+          <a:p>
+            <a:r>
+              <a:rPr lang="en-US" sz="1600" dirty="0" err="1">
+                <a:latin typeface="Consolas"/>
+                <a:cs typeface="Consolas"/>
+              </a:rPr>
+              <a:t>d$text</a:t>
+            </a:r>
+            <a:r>
+              <a:rPr lang="en-US" sz="1600" dirty="0">
+                <a:latin typeface="Consolas"/>
+                <a:cs typeface="Consolas"/>
+              </a:rPr>
+              <a:t> &lt;- </a:t>
+            </a:r>
+            <a:r>
+              <a:rPr lang="en-US" sz="1600" dirty="0" err="1">
+                <a:latin typeface="Consolas"/>
+                <a:cs typeface="Consolas"/>
+              </a:rPr>
+              <a:t>gsub</a:t>
+            </a:r>
+            <a:r>
+              <a:rPr lang="en-US" sz="1600" dirty="0">
+                <a:latin typeface="Consolas"/>
+                <a:cs typeface="Consolas"/>
+              </a:rPr>
+              <a:t>("[[:space:]]+", ' ', </a:t>
+            </a:r>
+            <a:r>
+              <a:rPr lang="en-US" sz="1600" dirty="0" err="1">
+                <a:latin typeface="Consolas"/>
+                <a:cs typeface="Consolas"/>
+              </a:rPr>
+              <a:t>d$text</a:t>
+            </a:r>
+            <a:r>
+              <a:rPr lang="en-US" sz="1600" dirty="0">
+                <a:latin typeface="Consolas"/>
+                <a:cs typeface="Consolas"/>
+              </a:rPr>
+              <a:t>)</a:t>
+            </a:r>
+          </a:p>
+          <a:p>
+            <a:r>
+              <a:rPr lang="en-US" sz="1600" dirty="0" err="1">
+                <a:latin typeface="Consolas"/>
+                <a:cs typeface="Consolas"/>
+              </a:rPr>
+              <a:t>d$text</a:t>
+            </a:r>
+            <a:r>
+              <a:rPr lang="en-US" sz="1600" dirty="0">
+                <a:latin typeface="Consolas"/>
+                <a:cs typeface="Consolas"/>
+              </a:rPr>
+              <a:t> &lt;- </a:t>
+            </a:r>
+            <a:r>
+              <a:rPr lang="en-US" sz="1600" dirty="0" err="1">
+                <a:latin typeface="Consolas"/>
+                <a:cs typeface="Consolas"/>
+              </a:rPr>
+              <a:t>tolower</a:t>
+            </a:r>
+            <a:r>
+              <a:rPr lang="en-US" sz="1600" dirty="0">
+                <a:latin typeface="Consolas"/>
+                <a:cs typeface="Consolas"/>
+              </a:rPr>
+              <a:t>(</a:t>
+            </a:r>
+            <a:r>
+              <a:rPr lang="en-US" sz="1600" dirty="0" err="1">
+                <a:latin typeface="Consolas"/>
+                <a:cs typeface="Consolas"/>
+              </a:rPr>
+              <a:t>d$text</a:t>
+            </a:r>
+            <a:r>
+              <a:rPr lang="en-US" sz="1600" dirty="0">
+                <a:latin typeface="Consolas"/>
+                <a:cs typeface="Consolas"/>
+              </a:rPr>
+              <a:t>)</a:t>
+            </a:r>
+            <a:endParaRPr lang="en-US" sz="1600" dirty="0" smtClean="0">
+              <a:latin typeface="Consolas"/>
+              <a:cs typeface="Consolas"/>
+            </a:endParaRPr>
           </a:p>
         </p:txBody>
       </p:sp>
     </p:spTree>
     <p:extLst>
       <p:ext uri="{BB962C8B-B14F-4D97-AF65-F5344CB8AC3E}">
-        <p14:creationId xmlns:p14="http://schemas.microsoft.com/office/powerpoint/2010/main" val="2191620834"/>
+        <p14:creationId xmlns:p14="http://schemas.microsoft.com/office/powerpoint/2010/main" val="155599073"/>
       </p:ext>
     </p:extLst>
   </p:cSld>
@@ -4032,7 +5703,7 @@
           <a:p>
             <a:r>
               <a:rPr lang="en-US" dirty="0" smtClean="0"/>
-              <a:t>Better Dictionaries?</a:t>
+              <a:t>Quantifying Sentiment</a:t>
             </a:r>
             <a:endParaRPr lang="en-US" dirty="0"/>
           </a:p>
@@ -4048,118 +5719,40 @@
             <p:ph idx="1"/>
           </p:nvPr>
         </p:nvSpPr>
-        <p:spPr>
-          <a:xfrm>
-            <a:off x="320235" y="1436420"/>
-            <a:ext cx="8229600" cy="4525963"/>
-          </a:xfrm>
-        </p:spPr>
+        <p:spPr/>
         <p:txBody>
           <a:bodyPr/>
           <a:lstStyle/>
           <a:p>
             <a:r>
-              <a:rPr lang="en-US" dirty="0" err="1" smtClean="0"/>
-              <a:t>SentiWordNet</a:t>
-            </a:r>
-            <a:endParaRPr lang="en-US" dirty="0" smtClean="0"/>
-          </a:p>
-          <a:p>
-            <a:pPr lvl="1"/>
-            <a:r>
-              <a:rPr lang="en-US" dirty="0" smtClean="0"/>
-              <a:t>Derived from </a:t>
-            </a:r>
-            <a:r>
-              <a:rPr lang="en-US" dirty="0" err="1" smtClean="0"/>
-              <a:t>WordNet</a:t>
-            </a:r>
-            <a:r>
-              <a:rPr lang="en-US" dirty="0" smtClean="0"/>
-              <a:t>, each term is assigned a positivity and negativity</a:t>
-            </a:r>
-            <a:br>
-              <a:rPr lang="en-US" dirty="0" smtClean="0"/>
-            </a:br>
-            <a:r>
-              <a:rPr lang="en-US" dirty="0" smtClean="0"/>
-              <a:t> score</a:t>
-            </a:r>
-          </a:p>
-          <a:p>
-            <a:pPr lvl="1"/>
-            <a:r>
-              <a:rPr lang="en-US" dirty="0" smtClean="0"/>
-              <a:t>Objectivity score </a:t>
-            </a:r>
-            <a:br>
-              <a:rPr lang="en-US" dirty="0" smtClean="0"/>
-            </a:br>
-            <a:r>
-              <a:rPr lang="en-US" dirty="0" smtClean="0"/>
-              <a:t>defined as 1 – (</a:t>
-            </a:r>
-            <a:r>
-              <a:rPr lang="en-US" dirty="0" err="1" smtClean="0"/>
-              <a:t>Pos+Neg</a:t>
-            </a:r>
-            <a:r>
-              <a:rPr lang="en-US" dirty="0" smtClean="0"/>
-              <a:t>)</a:t>
-            </a:r>
-          </a:p>
-          <a:p>
-            <a:pPr lvl="1"/>
-            <a:r>
-              <a:rPr lang="en-US" dirty="0" smtClean="0"/>
-              <a:t>206K terms</a:t>
-            </a:r>
-          </a:p>
-          <a:p>
-            <a:pPr lvl="1"/>
-            <a:r>
-              <a:rPr lang="en-US" dirty="0" smtClean="0"/>
-              <a:t>Converted to simple CSV</a:t>
-            </a:r>
-            <a:br>
-              <a:rPr lang="en-US" dirty="0" smtClean="0"/>
-            </a:br>
-            <a:r>
-              <a:rPr lang="en-US" dirty="0" smtClean="0"/>
-              <a:t> for easy import into R</a:t>
-            </a:r>
-            <a:endParaRPr lang="en-US" dirty="0"/>
-          </a:p>
-        </p:txBody>
-      </p:sp>
-      <p:pic>
-        <p:nvPicPr>
-          <p:cNvPr id="4" name="Picture 3"/>
-          <p:cNvPicPr>
-            <a:picLocks noChangeAspect="1"/>
-          </p:cNvPicPr>
-          <p:nvPr/>
-        </p:nvPicPr>
-        <p:blipFill>
-          <a:blip r:embed="rId3"/>
-          <a:stretch>
-            <a:fillRect/>
-          </a:stretch>
-        </p:blipFill>
-        <p:spPr>
-          <a:xfrm>
-            <a:off x="4892953" y="2606953"/>
-            <a:ext cx="4251047" cy="4251047"/>
-          </a:xfrm>
-          <a:prstGeom prst="rect">
-            <a:avLst/>
-          </a:prstGeom>
-        </p:spPr>
-      </p:pic>
+              <a:rPr lang="en-US" dirty="0" smtClean="0"/>
+              <a:t>Based on identifying words with positive or negative connotations</a:t>
+            </a:r>
+          </a:p>
+          <a:p>
+            <a:r>
+              <a:rPr lang="en-US" dirty="0" smtClean="0"/>
+              <a:t>Fundamentally based on looking up words from a dictionary</a:t>
+            </a:r>
+          </a:p>
+          <a:p>
+            <a:r>
+              <a:rPr lang="en-US" dirty="0" smtClean="0"/>
+              <a:t>If a tweet has more positive words than negative words, the tweet is positive</a:t>
+            </a:r>
+          </a:p>
+          <a:p>
+            <a:r>
+              <a:rPr lang="en-US" dirty="0" smtClean="0"/>
+              <a:t>More sophisticated scoring schemes are possible</a:t>
+            </a:r>
+          </a:p>
+        </p:txBody>
+      </p:sp>
     </p:spTree>
     <p:extLst>
       <p:ext uri="{BB962C8B-B14F-4D97-AF65-F5344CB8AC3E}">
-        <p14:creationId xmlns:p14="http://schemas.microsoft.com/office/powerpoint/2010/main" val="1364420543"/>
+        <p14:creationId xmlns:p14="http://schemas.microsoft.com/office/powerpoint/2010/main" val="2191620834"/>
       </p:ext>
     </p:extLst>
   </p:cSld>
@@ -4186,6 +5779,30 @@
           <a:chExt cx="0" cy="0"/>
         </a:xfrm>
       </p:grpSpPr>
+      <p:pic>
+        <p:nvPicPr>
+          <p:cNvPr id="5" name="Picture 4"/>
+          <p:cNvPicPr>
+            <a:picLocks noChangeAspect="1"/>
+          </p:cNvPicPr>
+          <p:nvPr/>
+        </p:nvPicPr>
+        <p:blipFill>
+          <a:blip r:embed="rId3"/>
+          <a:stretch>
+            <a:fillRect/>
+          </a:stretch>
+        </p:blipFill>
+        <p:spPr>
+          <a:xfrm>
+            <a:off x="3997598" y="3129880"/>
+            <a:ext cx="5254784" cy="3865588"/>
+          </a:xfrm>
+          <a:prstGeom prst="rect">
+            <a:avLst/>
+          </a:prstGeom>
+        </p:spPr>
+      </p:pic>
       <p:sp>
         <p:nvSpPr>
           <p:cNvPr id="2" name="Title 1"/>
@@ -4202,52 +5819,123 @@
           <a:lstStyle/>
           <a:p>
             <a:r>
-              <a:rPr lang="en-US" dirty="0" err="1" smtClean="0"/>
+              <a:rPr lang="en-US" dirty="0" smtClean="0"/>
+              <a:t>Better Dictionaries?</a:t>
+            </a:r>
+            <a:endParaRPr lang="en-US" dirty="0"/>
+          </a:p>
+        </p:txBody>
+      </p:sp>
+      <p:sp>
+        <p:nvSpPr>
+          <p:cNvPr id="3" name="Content Placeholder 2"/>
+          <p:cNvSpPr>
+            <a:spLocks noGrp="1"/>
+          </p:cNvSpPr>
+          <p:nvPr>
+            <p:ph idx="1"/>
+          </p:nvPr>
+        </p:nvSpPr>
+        <p:spPr>
+          <a:xfrm>
+            <a:off x="170818" y="1286994"/>
+            <a:ext cx="8229600" cy="5571005"/>
+          </a:xfrm>
+        </p:spPr>
+        <p:txBody>
+          <a:bodyPr>
+            <a:normAutofit/>
+          </a:bodyPr>
+          <a:lstStyle/>
+          <a:p>
+            <a:r>
+              <a:rPr lang="en-US" dirty="0" err="1" smtClean="0">
+                <a:hlinkClick r:id="rId4"/>
+              </a:rPr>
               <a:t>SentiWordNet</a:t>
             </a:r>
-            <a:endParaRPr lang="en-US" dirty="0"/>
-          </a:p>
-        </p:txBody>
-      </p:sp>
-      <p:sp>
-        <p:nvSpPr>
-          <p:cNvPr id="3" name="Content Placeholder 2"/>
-          <p:cNvSpPr>
-            <a:spLocks noGrp="1"/>
-          </p:cNvSpPr>
-          <p:nvPr>
-            <p:ph idx="1"/>
-          </p:nvPr>
-        </p:nvSpPr>
-        <p:spPr/>
-        <p:txBody>
-          <a:bodyPr/>
-          <a:lstStyle/>
-          <a:p>
-            <a:r>
-              <a:rPr lang="en-US" dirty="0" smtClean="0"/>
-              <a:t>Most words are neutral (</a:t>
-            </a:r>
-            <a:r>
-              <a:rPr lang="en-US" dirty="0" err="1" smtClean="0"/>
-              <a:t>ObjScore</a:t>
-            </a:r>
-            <a:r>
-              <a:rPr lang="en-US" dirty="0" smtClean="0"/>
-              <a:t> = 1.0)</a:t>
-            </a:r>
-          </a:p>
-          <a:p>
-            <a:r>
-              <a:rPr lang="en-US" dirty="0" smtClean="0"/>
-              <a:t>To derive a score for a tweet, we should ideally perform POS tagging</a:t>
-            </a:r>
+            <a:endParaRPr lang="en-US" dirty="0" smtClean="0"/>
           </a:p>
           <a:p>
             <a:pPr lvl="1"/>
             <a:r>
               <a:rPr lang="en-US" dirty="0" smtClean="0"/>
-              <a:t>Many cases where the same term can be used as different POS and scores will differ </a:t>
+              <a:t>Derived from </a:t>
+            </a:r>
+            <a:r>
+              <a:rPr lang="en-US" dirty="0" err="1" smtClean="0">
+                <a:hlinkClick r:id="rId5"/>
+              </a:rPr>
+              <a:t>WordNet</a:t>
+            </a:r>
+            <a:r>
+              <a:rPr lang="en-US" dirty="0" smtClean="0"/>
+              <a:t>, each term is assigned a positivity and </a:t>
+            </a:r>
+            <a:r>
+              <a:rPr lang="en-US" dirty="0" smtClean="0"/>
+              <a:t>negativity </a:t>
+            </a:r>
+            <a:r>
+              <a:rPr lang="en-US" dirty="0" smtClean="0"/>
+              <a:t>score</a:t>
+            </a:r>
+          </a:p>
+          <a:p>
+            <a:pPr lvl="1"/>
+            <a:r>
+              <a:rPr lang="en-US" dirty="0" smtClean="0"/>
+              <a:t>206K </a:t>
+            </a:r>
+            <a:r>
+              <a:rPr lang="en-US" dirty="0" smtClean="0"/>
+              <a:t>terms</a:t>
+            </a:r>
+          </a:p>
+          <a:p>
+            <a:pPr lvl="1"/>
+            <a:r>
+              <a:rPr lang="en-US" dirty="0" smtClean="0"/>
+              <a:t>Converted to </a:t>
+            </a:r>
+            <a:r>
+              <a:rPr lang="en-US" dirty="0" smtClean="0"/>
+              <a:t>simple </a:t>
+            </a:r>
+            <a:br>
+              <a:rPr lang="en-US" dirty="0" smtClean="0"/>
+            </a:br>
+            <a:r>
+              <a:rPr lang="en-US" dirty="0" smtClean="0"/>
+              <a:t>CSV</a:t>
+            </a:r>
+            <a:r>
+              <a:rPr lang="en-US" dirty="0" smtClean="0"/>
+              <a:t> </a:t>
+            </a:r>
+            <a:r>
+              <a:rPr lang="en-US" dirty="0" smtClean="0"/>
+              <a:t>for easy import </a:t>
+            </a:r>
+            <a:br>
+              <a:rPr lang="en-US" dirty="0" smtClean="0"/>
+            </a:br>
+            <a:r>
+              <a:rPr lang="en-US" dirty="0" smtClean="0"/>
+              <a:t>into R</a:t>
+            </a:r>
+          </a:p>
+          <a:p>
+            <a:r>
+              <a:rPr lang="en-US" dirty="0" smtClean="0"/>
+              <a:t>Ideally, should </a:t>
+            </a:r>
+            <a:br>
+              <a:rPr lang="en-US" dirty="0" smtClean="0"/>
+            </a:br>
+            <a:r>
+              <a:rPr lang="en-US" dirty="0" smtClean="0"/>
+              <a:t>perform POS tagging</a:t>
             </a:r>
             <a:endParaRPr lang="en-US" dirty="0"/>
           </a:p>
@@ -4256,7 +5944,7 @@
     </p:spTree>
     <p:extLst>
       <p:ext uri="{BB962C8B-B14F-4D97-AF65-F5344CB8AC3E}">
-        <p14:creationId xmlns:p14="http://schemas.microsoft.com/office/powerpoint/2010/main" val="4288015244"/>
+        <p14:creationId xmlns:p14="http://schemas.microsoft.com/office/powerpoint/2010/main" val="1364420543"/>
       </p:ext>
     </p:extLst>
   </p:cSld>
@@ -4522,25 +6210,62 @@
           </a:p>
           <a:p>
             <a:r>
+              <a:rPr lang="en-US" sz="1600" b="1" dirty="0" err="1" smtClean="0">
+                <a:latin typeface="Consolas"/>
+                <a:cs typeface="Consolas"/>
+              </a:rPr>
+              <a:t>swn.match</a:t>
+            </a:r>
+            <a:r>
+              <a:rPr lang="en-US" sz="1600" dirty="0" smtClean="0">
+                <a:latin typeface="Consolas"/>
+                <a:cs typeface="Consolas"/>
+              </a:rPr>
+              <a:t> </a:t>
+            </a:r>
+            <a:r>
+              <a:rPr lang="en-US" sz="1600" dirty="0" smtClean="0">
+                <a:latin typeface="Consolas"/>
+                <a:cs typeface="Consolas"/>
+              </a:rPr>
+              <a:t>&lt;- function(w) {</a:t>
+            </a:r>
+          </a:p>
+          <a:p>
+            <a:r>
+              <a:rPr lang="en-US" sz="1600" dirty="0" smtClean="0">
+                <a:latin typeface="Consolas"/>
+                <a:cs typeface="Consolas"/>
+              </a:rPr>
+              <a:t>  </a:t>
+            </a:r>
+            <a:r>
               <a:rPr lang="en-US" sz="1600" dirty="0" err="1" smtClean="0">
                 <a:latin typeface="Consolas"/>
                 <a:cs typeface="Consolas"/>
               </a:rPr>
-              <a:t>swn.match</a:t>
+              <a:t>tmp</a:t>
             </a:r>
             <a:r>
               <a:rPr lang="en-US" sz="1600" dirty="0" smtClean="0">
                 <a:latin typeface="Consolas"/>
                 <a:cs typeface="Consolas"/>
               </a:rPr>
-              <a:t> </a:t>
+              <a:t> &lt;- subset(</a:t>
+            </a:r>
+            <a:r>
+              <a:rPr lang="en-US" sz="1600" dirty="0" err="1" smtClean="0">
+                <a:latin typeface="Consolas"/>
+                <a:cs typeface="Consolas"/>
+              </a:rPr>
+              <a:t>swn</a:t>
             </a:r>
             <a:r>
               <a:rPr lang="en-US" sz="1600" dirty="0" smtClean="0">
                 <a:latin typeface="Consolas"/>
                 <a:cs typeface="Consolas"/>
               </a:rPr>
-              <a:t>&lt;- function(w) {</a:t>
+              <a:t>, Term == w)</a:t>
             </a:r>
           </a:p>
           <a:p>
@@ -4549,13 +6274,27 @@
                 <a:latin typeface="Consolas"/>
                 <a:cs typeface="Consolas"/>
               </a:rPr>
-              <a:t>  </a:t>
+              <a:t>  if (</a:t>
             </a:r>
             <a:r>
               <a:rPr lang="en-US" sz="1600" dirty="0" err="1" smtClean="0">
                 <a:latin typeface="Consolas"/>
                 <a:cs typeface="Consolas"/>
               </a:rPr>
+              <a:t>nrow</a:t>
+            </a:r>
+            <a:r>
+              <a:rPr lang="en-US" sz="1600" dirty="0" smtClean="0">
+                <a:latin typeface="Consolas"/>
+                <a:cs typeface="Consolas"/>
+              </a:rPr>
+              <a:t>(</a:t>
+            </a:r>
+            <a:r>
+              <a:rPr lang="en-US" sz="1600" dirty="0" err="1" smtClean="0">
+                <a:latin typeface="Consolas"/>
+                <a:cs typeface="Consolas"/>
+              </a:rPr>
               <a:t>tmp</a:t>
             </a:r>
             <a:r>
@@ -4563,72 +6302,7 @@
                 <a:latin typeface="Consolas"/>
                 <a:cs typeface="Consolas"/>
               </a:rPr>
-              <a:t> &lt;- subset(</a:t>
-            </a:r>
-            <a:r>
-              <a:rPr lang="en-US" sz="1600" dirty="0" err="1" smtClean="0">
-                <a:latin typeface="Consolas"/>
-                <a:cs typeface="Consolas"/>
-              </a:rPr>
-              <a:t>swn</a:t>
-            </a:r>
-            <a:r>
-              <a:rPr lang="en-US" sz="1600" dirty="0" smtClean="0">
-                <a:latin typeface="Consolas"/>
-                <a:cs typeface="Consolas"/>
-              </a:rPr>
-              <a:t>, Term == w)</a:t>
-            </a:r>
-          </a:p>
-          <a:p>
-            <a:r>
-              <a:rPr lang="en-US" sz="1600" dirty="0" smtClean="0">
-                <a:latin typeface="Consolas"/>
-                <a:cs typeface="Consolas"/>
-              </a:rPr>
-              <a:t>  if (</a:t>
-            </a:r>
-            <a:r>
-              <a:rPr lang="en-US" sz="1600" dirty="0" err="1" smtClean="0">
-                <a:latin typeface="Consolas"/>
-                <a:cs typeface="Consolas"/>
-              </a:rPr>
-              <a:t>nrow</a:t>
-            </a:r>
-            <a:r>
-              <a:rPr lang="en-US" sz="1600" dirty="0" smtClean="0">
-                <a:latin typeface="Consolas"/>
-                <a:cs typeface="Consolas"/>
-              </a:rPr>
-              <a:t>(</a:t>
-            </a:r>
-            <a:r>
-              <a:rPr lang="en-US" sz="1600" dirty="0" err="1" smtClean="0">
-                <a:latin typeface="Consolas"/>
-                <a:cs typeface="Consolas"/>
-              </a:rPr>
-              <a:t>tmp</a:t>
-            </a:r>
-            <a:r>
-              <a:rPr lang="en-US" sz="1600" dirty="0" smtClean="0">
-                <a:latin typeface="Consolas"/>
-                <a:cs typeface="Consolas"/>
-              </a:rPr>
-              <a:t>) &gt;= 1</a:t>
-            </a:r>
-            <a:r>
-              <a:rPr lang="en-US" sz="1600" dirty="0" smtClean="0">
-                <a:latin typeface="Consolas"/>
-                <a:cs typeface="Consolas"/>
-              </a:rPr>
-              <a:t>) return</a:t>
-            </a:r>
-            <a:r>
-              <a:rPr lang="en-US" sz="1600" dirty="0" smtClean="0">
-                <a:latin typeface="Consolas"/>
-                <a:cs typeface="Consolas"/>
-              </a:rPr>
-              <a:t>(</a:t>
+              <a:t>) &gt;= 1) return(</a:t>
             </a:r>
             <a:r>
               <a:rPr lang="en-US" sz="1600" dirty="0" err="1" smtClean="0">
@@ -4671,7 +6345,7 @@
           </a:p>
           <a:p>
             <a:r>
-              <a:rPr lang="en-US" sz="1600" dirty="0" err="1" smtClean="0">
+              <a:rPr lang="en-US" sz="1600" b="1" dirty="0" err="1" smtClean="0">
                 <a:latin typeface="Consolas"/>
                 <a:cs typeface="Consolas"/>
               </a:rPr>
@@ -5024,86 +6698,729 @@
         </p:nvSpPr>
         <p:spPr/>
         <p:txBody>
+          <a:bodyPr>
+            <a:normAutofit/>
+          </a:bodyPr>
+          <a:lstStyle/>
+          <a:p>
+            <a:r>
+              <a:rPr lang="en-US" dirty="0" smtClean="0"/>
+              <a:t>Profiling Makes Me Happy</a:t>
+            </a:r>
+            <a:endParaRPr lang="en-US" dirty="0"/>
+          </a:p>
+        </p:txBody>
+      </p:sp>
+      <p:sp>
+        <p:nvSpPr>
+          <p:cNvPr id="3" name="Content Placeholder 2"/>
+          <p:cNvSpPr>
+            <a:spLocks noGrp="1"/>
+          </p:cNvSpPr>
+          <p:nvPr>
+            <p:ph idx="1"/>
+          </p:nvPr>
+        </p:nvSpPr>
+        <p:spPr/>
+        <p:txBody>
           <a:bodyPr/>
           <a:lstStyle/>
           <a:p>
             <a:r>
-              <a:rPr lang="en-US" dirty="0" smtClean="0"/>
-              <a:t>Other Considerations</a:t>
-            </a:r>
-            <a:endParaRPr lang="en-US" dirty="0"/>
-          </a:p>
-        </p:txBody>
-      </p:sp>
-      <p:sp>
-        <p:nvSpPr>
-          <p:cNvPr id="3" name="Content Placeholder 2"/>
-          <p:cNvSpPr>
-            <a:spLocks noGrp="1"/>
-          </p:cNvSpPr>
-          <p:nvPr>
-            <p:ph idx="1"/>
-          </p:nvPr>
-        </p:nvSpPr>
-        <p:spPr/>
-        <p:txBody>
-          <a:bodyPr/>
+              <a:rPr lang="en-US" b="1" dirty="0" smtClean="0"/>
+              <a:t>6052 sec </a:t>
+            </a:r>
+            <a:r>
+              <a:rPr lang="en-US" dirty="0" smtClean="0"/>
+              <a:t>with</a:t>
+            </a:r>
+            <a:br>
+              <a:rPr lang="en-US" dirty="0" smtClean="0"/>
+            </a:br>
+            <a:r>
+              <a:rPr lang="en-US" dirty="0" smtClean="0"/>
+              <a:t>24 cores</a:t>
+            </a:r>
+          </a:p>
+          <a:p>
+            <a:r>
+              <a:rPr lang="en-US" dirty="0" err="1" smtClean="0"/>
+              <a:t>Rprof</a:t>
+            </a:r>
+            <a:r>
+              <a:rPr lang="en-US" dirty="0" smtClean="0"/>
+              <a:t>()</a:t>
+            </a:r>
+            <a:r>
+              <a:rPr lang="en-US" dirty="0"/>
+              <a:t> </a:t>
+            </a:r>
+            <a:r>
+              <a:rPr lang="en-US" dirty="0" smtClean="0"/>
+              <a:t>is a </a:t>
+            </a:r>
+            <a:br>
+              <a:rPr lang="en-US" dirty="0" smtClean="0"/>
+            </a:br>
+            <a:r>
+              <a:rPr lang="en-US" dirty="0" smtClean="0"/>
+              <a:t>good way to</a:t>
+            </a:r>
+            <a:br>
+              <a:rPr lang="en-US" dirty="0" smtClean="0"/>
+            </a:br>
+            <a:r>
+              <a:rPr lang="en-US" dirty="0" smtClean="0"/>
+              <a:t>identify </a:t>
+            </a:r>
+            <a:br>
+              <a:rPr lang="en-US" dirty="0" smtClean="0"/>
+            </a:br>
+            <a:r>
+              <a:rPr lang="en-US" dirty="0" smtClean="0"/>
+              <a:t>bottlenecks*</a:t>
+            </a:r>
+          </a:p>
+          <a:p>
+            <a:r>
+              <a:rPr lang="en-US" b="1" dirty="0" smtClean="0"/>
+              <a:t>461 sec</a:t>
+            </a:r>
+            <a:r>
+              <a:rPr lang="en-US" dirty="0" smtClean="0"/>
+              <a:t> with</a:t>
+            </a:r>
+            <a:br>
+              <a:rPr lang="en-US" dirty="0" smtClean="0"/>
+            </a:br>
+            <a:r>
+              <a:rPr lang="en-US" dirty="0" smtClean="0"/>
+              <a:t>24 cores</a:t>
+            </a:r>
+          </a:p>
+        </p:txBody>
+      </p:sp>
+      <p:sp>
+        <p:nvSpPr>
+          <p:cNvPr id="4" name="TextBox 3"/>
+          <p:cNvSpPr txBox="1"/>
+          <p:nvPr/>
+        </p:nvSpPr>
+        <p:spPr>
+          <a:xfrm>
+            <a:off x="3276600" y="1417638"/>
+            <a:ext cx="5712421" cy="5262980"/>
+          </a:xfrm>
+          <a:prstGeom prst="rect">
+            <a:avLst/>
+          </a:prstGeom>
+          <a:solidFill>
+            <a:schemeClr val="bg2">
+              <a:lumMod val="90000"/>
+            </a:schemeClr>
+          </a:solidFill>
+          <a:ln>
+            <a:solidFill>
+              <a:schemeClr val="tx1"/>
+            </a:solidFill>
+          </a:ln>
+          <a:effectLst>
+            <a:outerShdw blurRad="50800" dist="38100" dir="2700000" algn="tl" rotWithShape="0">
+              <a:prstClr val="black">
+                <a:alpha val="40000"/>
+              </a:prstClr>
+            </a:outerShdw>
+          </a:effectLst>
+        </p:spPr>
+        <p:txBody>
+          <a:bodyPr wrap="none" rtlCol="0">
+            <a:spAutoFit/>
+          </a:bodyPr>
           <a:lstStyle/>
           <a:p>
             <a:r>
-              <a:rPr lang="en-US" dirty="0" smtClean="0"/>
-              <a:t>Should take into account negation </a:t>
-            </a:r>
-          </a:p>
-          <a:p>
-            <a:pPr lvl="1"/>
-            <a:r>
-              <a:rPr lang="en-US" dirty="0" smtClean="0"/>
-              <a:t>Scan for negation terms and adjust score </a:t>
-            </a:r>
-            <a:r>
-              <a:rPr lang="en-US" dirty="0" smtClean="0"/>
-              <a:t>appropriately</a:t>
-            </a:r>
-          </a:p>
-          <a:p>
-            <a:r>
-              <a:rPr lang="en-US" dirty="0" smtClean="0"/>
-              <a:t>Oblivious </a:t>
-            </a:r>
-            <a:r>
-              <a:rPr lang="en-US" dirty="0" smtClean="0"/>
-              <a:t>to </a:t>
-            </a:r>
-            <a:r>
-              <a:rPr lang="en-US" dirty="0" smtClean="0"/>
-              <a:t>sarcasm</a:t>
-            </a:r>
-          </a:p>
-          <a:p>
-            <a:r>
-              <a:rPr lang="en-US" dirty="0"/>
-              <a:t>Sentiment scores should probably be modified by context</a:t>
-            </a:r>
-          </a:p>
-          <a:p>
-            <a:pPr lvl="1"/>
-            <a:r>
-              <a:rPr lang="en-US" dirty="0" smtClean="0"/>
-              <a:t>ML methods will be sensitive to the nature of the </a:t>
-            </a:r>
-            <a:r>
-              <a:rPr lang="en-US" smtClean="0"/>
-              <a:t>corpora employed</a:t>
-            </a:r>
-            <a:endParaRPr lang="en-US" dirty="0"/>
+              <a:rPr lang="en-US" sz="1600" b="1" dirty="0" err="1" smtClean="0">
+                <a:latin typeface="Consolas"/>
+                <a:cs typeface="Consolas"/>
+              </a:rPr>
+              <a:t>swn.match</a:t>
+            </a:r>
+            <a:r>
+              <a:rPr lang="en-US" sz="1600" dirty="0" smtClean="0">
+                <a:latin typeface="Consolas"/>
+                <a:cs typeface="Consolas"/>
+              </a:rPr>
+              <a:t> </a:t>
+            </a:r>
+            <a:r>
+              <a:rPr lang="en-US" sz="1600" dirty="0" smtClean="0">
+                <a:latin typeface="Consolas"/>
+                <a:cs typeface="Consolas"/>
+              </a:rPr>
+              <a:t>&lt;- function(w) {</a:t>
+            </a:r>
+          </a:p>
+          <a:p>
+            <a:r>
+              <a:rPr lang="en-US" sz="1600" dirty="0" smtClean="0">
+                <a:latin typeface="Consolas"/>
+                <a:cs typeface="Consolas"/>
+              </a:rPr>
+              <a:t>  </a:t>
+            </a:r>
+            <a:r>
+              <a:rPr lang="en-US" sz="1600" dirty="0" err="1" smtClean="0">
+                <a:latin typeface="Consolas"/>
+                <a:cs typeface="Consolas"/>
+              </a:rPr>
+              <a:t>tmp</a:t>
+            </a:r>
+            <a:r>
+              <a:rPr lang="en-US" sz="1600" dirty="0" smtClean="0">
+                <a:latin typeface="Consolas"/>
+                <a:cs typeface="Consolas"/>
+              </a:rPr>
+              <a:t> &lt;- subset(</a:t>
+            </a:r>
+            <a:r>
+              <a:rPr lang="en-US" sz="1600" dirty="0" err="1" smtClean="0">
+                <a:latin typeface="Consolas"/>
+                <a:cs typeface="Consolas"/>
+              </a:rPr>
+              <a:t>swn</a:t>
+            </a:r>
+            <a:r>
+              <a:rPr lang="en-US" sz="1600" dirty="0" smtClean="0">
+                <a:latin typeface="Consolas"/>
+                <a:cs typeface="Consolas"/>
+              </a:rPr>
+              <a:t>, Term == w)</a:t>
+            </a:r>
+          </a:p>
+          <a:p>
+            <a:r>
+              <a:rPr lang="en-US" sz="1600" dirty="0" smtClean="0">
+                <a:latin typeface="Consolas"/>
+                <a:cs typeface="Consolas"/>
+              </a:rPr>
+              <a:t>  if (</a:t>
+            </a:r>
+            <a:r>
+              <a:rPr lang="en-US" sz="1600" dirty="0" err="1" smtClean="0">
+                <a:latin typeface="Consolas"/>
+                <a:cs typeface="Consolas"/>
+              </a:rPr>
+              <a:t>nrow</a:t>
+            </a:r>
+            <a:r>
+              <a:rPr lang="en-US" sz="1600" dirty="0" smtClean="0">
+                <a:latin typeface="Consolas"/>
+                <a:cs typeface="Consolas"/>
+              </a:rPr>
+              <a:t>(</a:t>
+            </a:r>
+            <a:r>
+              <a:rPr lang="en-US" sz="1600" dirty="0" err="1" smtClean="0">
+                <a:latin typeface="Consolas"/>
+                <a:cs typeface="Consolas"/>
+              </a:rPr>
+              <a:t>tmp</a:t>
+            </a:r>
+            <a:r>
+              <a:rPr lang="en-US" sz="1600" dirty="0" smtClean="0">
+                <a:latin typeface="Consolas"/>
+                <a:cs typeface="Consolas"/>
+              </a:rPr>
+              <a:t>) &gt;= 1) return(</a:t>
+            </a:r>
+            <a:r>
+              <a:rPr lang="en-US" sz="1600" dirty="0" err="1" smtClean="0">
+                <a:latin typeface="Consolas"/>
+                <a:cs typeface="Consolas"/>
+              </a:rPr>
+              <a:t>tmp</a:t>
+            </a:r>
+            <a:r>
+              <a:rPr lang="en-US" sz="1600" dirty="0" smtClean="0">
+                <a:latin typeface="Consolas"/>
+                <a:cs typeface="Consolas"/>
+              </a:rPr>
+              <a:t>[1,c(3,4)])</a:t>
+            </a:r>
+          </a:p>
+          <a:p>
+            <a:r>
+              <a:rPr lang="en-US" sz="1600" dirty="0" smtClean="0">
+                <a:latin typeface="Consolas"/>
+                <a:cs typeface="Consolas"/>
+              </a:rPr>
+              <a:t>  else return(c(0,0))</a:t>
+            </a:r>
+          </a:p>
+          <a:p>
+            <a:r>
+              <a:rPr lang="en-US" sz="1600" dirty="0" smtClean="0">
+                <a:latin typeface="Consolas"/>
+                <a:cs typeface="Consolas"/>
+              </a:rPr>
+              <a:t>}</a:t>
+            </a:r>
+            <a:endParaRPr lang="en-US" sz="1600" dirty="0" smtClean="0">
+              <a:latin typeface="Consolas"/>
+              <a:cs typeface="Consolas"/>
+            </a:endParaRPr>
+          </a:p>
+          <a:p>
+            <a:r>
+              <a:rPr lang="en-US" sz="1600" b="1" dirty="0" err="1" smtClean="0">
+                <a:latin typeface="Consolas"/>
+                <a:cs typeface="Consolas"/>
+              </a:rPr>
+              <a:t>score.swn</a:t>
+            </a:r>
+            <a:r>
+              <a:rPr lang="en-US" sz="1600" dirty="0" smtClean="0">
+                <a:latin typeface="Consolas"/>
+                <a:cs typeface="Consolas"/>
+              </a:rPr>
+              <a:t> &lt;- function(tweet) {</a:t>
+            </a:r>
+          </a:p>
+          <a:p>
+            <a:r>
+              <a:rPr lang="en-US" sz="1600" dirty="0" smtClean="0">
+                <a:latin typeface="Consolas"/>
+                <a:cs typeface="Consolas"/>
+              </a:rPr>
+              <a:t>  words &lt;- </a:t>
+            </a:r>
+            <a:r>
+              <a:rPr lang="en-US" sz="1600" dirty="0" err="1" smtClean="0">
+                <a:latin typeface="Consolas"/>
+                <a:cs typeface="Consolas"/>
+              </a:rPr>
+              <a:t>strsplit</a:t>
+            </a:r>
+            <a:r>
+              <a:rPr lang="en-US" sz="1600" dirty="0" smtClean="0">
+                <a:latin typeface="Consolas"/>
+                <a:cs typeface="Consolas"/>
+              </a:rPr>
+              <a:t>(tweet, "\\s+")[[1]]</a:t>
+            </a:r>
+          </a:p>
+          <a:p>
+            <a:r>
+              <a:rPr lang="en-US" sz="1600" dirty="0" smtClean="0">
+                <a:latin typeface="Consolas"/>
+                <a:cs typeface="Consolas"/>
+              </a:rPr>
+              <a:t>  </a:t>
+            </a:r>
+            <a:r>
+              <a:rPr lang="en-US" sz="1600" dirty="0" err="1" smtClean="0">
+                <a:latin typeface="Consolas"/>
+                <a:cs typeface="Consolas"/>
+              </a:rPr>
+              <a:t>cs</a:t>
+            </a:r>
+            <a:r>
+              <a:rPr lang="en-US" sz="1600" dirty="0" smtClean="0">
+                <a:latin typeface="Consolas"/>
+                <a:cs typeface="Consolas"/>
+              </a:rPr>
+              <a:t> &lt;- </a:t>
+            </a:r>
+            <a:r>
+              <a:rPr lang="en-US" sz="1600" dirty="0" err="1" smtClean="0">
+                <a:latin typeface="Consolas"/>
+                <a:cs typeface="Consolas"/>
+              </a:rPr>
+              <a:t>colSums</a:t>
+            </a:r>
+            <a:r>
+              <a:rPr lang="en-US" sz="1600" dirty="0" smtClean="0">
+                <a:latin typeface="Consolas"/>
+                <a:cs typeface="Consolas"/>
+              </a:rPr>
+              <a:t>(</a:t>
+            </a:r>
+            <a:r>
+              <a:rPr lang="en-US" sz="1600" dirty="0" err="1" smtClean="0">
+                <a:latin typeface="Consolas"/>
+                <a:cs typeface="Consolas"/>
+              </a:rPr>
+              <a:t>do.call</a:t>
+            </a:r>
+            <a:r>
+              <a:rPr lang="en-US" sz="1600" dirty="0" smtClean="0">
+                <a:latin typeface="Consolas"/>
+                <a:cs typeface="Consolas"/>
+              </a:rPr>
+              <a:t>('</a:t>
+            </a:r>
+            <a:r>
+              <a:rPr lang="en-US" sz="1600" dirty="0" err="1" smtClean="0">
+                <a:latin typeface="Consolas"/>
+                <a:cs typeface="Consolas"/>
+              </a:rPr>
+              <a:t>rbind</a:t>
+            </a:r>
+            <a:r>
+              <a:rPr lang="en-US" sz="1600" dirty="0" smtClean="0">
+                <a:latin typeface="Consolas"/>
+                <a:cs typeface="Consolas"/>
+              </a:rPr>
+              <a:t>',</a:t>
+            </a:r>
+          </a:p>
+          <a:p>
+            <a:r>
+              <a:rPr lang="en-US" sz="1600" dirty="0" smtClean="0">
+                <a:latin typeface="Consolas"/>
+                <a:cs typeface="Consolas"/>
+              </a:rPr>
+              <a:t>                        </a:t>
+            </a:r>
+            <a:r>
+              <a:rPr lang="en-US" sz="1600" dirty="0" err="1" smtClean="0">
+                <a:latin typeface="Consolas"/>
+                <a:cs typeface="Consolas"/>
+              </a:rPr>
+              <a:t>lapply</a:t>
+            </a:r>
+            <a:r>
+              <a:rPr lang="en-US" sz="1600" dirty="0" smtClean="0">
+                <a:latin typeface="Consolas"/>
+                <a:cs typeface="Consolas"/>
+              </a:rPr>
+              <a:t>(words, function(z) </a:t>
+            </a:r>
+            <a:br>
+              <a:rPr lang="en-US" sz="1600" dirty="0" smtClean="0">
+                <a:latin typeface="Consolas"/>
+                <a:cs typeface="Consolas"/>
+              </a:rPr>
+            </a:br>
+            <a:r>
+              <a:rPr lang="en-US" sz="1600" dirty="0" smtClean="0">
+                <a:latin typeface="Consolas"/>
+                <a:cs typeface="Consolas"/>
+              </a:rPr>
+              <a:t>                               </a:t>
+            </a:r>
+            <a:r>
+              <a:rPr lang="en-US" sz="1600" dirty="0" err="1" smtClean="0">
+                <a:latin typeface="Consolas"/>
+                <a:cs typeface="Consolas"/>
+              </a:rPr>
+              <a:t>swn.match</a:t>
+            </a:r>
+            <a:r>
+              <a:rPr lang="en-US" sz="1600" dirty="0" smtClean="0">
+                <a:latin typeface="Consolas"/>
+                <a:cs typeface="Consolas"/>
+              </a:rPr>
+              <a:t>(z))))</a:t>
+            </a:r>
+          </a:p>
+          <a:p>
+            <a:r>
+              <a:rPr lang="en-US" sz="1600" dirty="0" smtClean="0">
+                <a:latin typeface="Consolas"/>
+                <a:cs typeface="Consolas"/>
+              </a:rPr>
+              <a:t>  return(</a:t>
+            </a:r>
+            <a:r>
+              <a:rPr lang="en-US" sz="1600" dirty="0" err="1" smtClean="0">
+                <a:latin typeface="Consolas"/>
+                <a:cs typeface="Consolas"/>
+              </a:rPr>
+              <a:t>cs</a:t>
+            </a:r>
+            <a:r>
+              <a:rPr lang="en-US" sz="1600" dirty="0" smtClean="0">
+                <a:latin typeface="Consolas"/>
+                <a:cs typeface="Consolas"/>
+              </a:rPr>
+              <a:t>[1]-</a:t>
+            </a:r>
+            <a:r>
+              <a:rPr lang="en-US" sz="1600" dirty="0" err="1" smtClean="0">
+                <a:latin typeface="Consolas"/>
+                <a:cs typeface="Consolas"/>
+              </a:rPr>
+              <a:t>cs</a:t>
+            </a:r>
+            <a:r>
+              <a:rPr lang="en-US" sz="1600" dirty="0" smtClean="0">
+                <a:latin typeface="Consolas"/>
+                <a:cs typeface="Consolas"/>
+              </a:rPr>
+              <a:t>[2])</a:t>
+            </a:r>
+          </a:p>
+          <a:p>
+            <a:r>
+              <a:rPr lang="en-US" sz="1600" dirty="0" smtClean="0">
+                <a:latin typeface="Consolas"/>
+                <a:cs typeface="Consolas"/>
+              </a:rPr>
+              <a:t>}</a:t>
+            </a:r>
+          </a:p>
+          <a:p>
+            <a:endParaRPr lang="en-US" sz="1600" dirty="0" smtClean="0">
+              <a:latin typeface="Consolas"/>
+              <a:cs typeface="Consolas"/>
+            </a:endParaRPr>
+          </a:p>
+          <a:p>
+            <a:r>
+              <a:rPr lang="en-US" sz="1600" b="1" dirty="0">
+                <a:latin typeface="Consolas"/>
+                <a:cs typeface="Consolas"/>
+              </a:rPr>
+              <a:t>score.swn.2</a:t>
+            </a:r>
+            <a:r>
+              <a:rPr lang="en-US" sz="1600" i="1" dirty="0">
+                <a:latin typeface="Consolas"/>
+                <a:cs typeface="Consolas"/>
+              </a:rPr>
+              <a:t> </a:t>
+            </a:r>
+            <a:r>
+              <a:rPr lang="en-US" sz="1600" dirty="0">
+                <a:latin typeface="Consolas"/>
+                <a:cs typeface="Consolas"/>
+              </a:rPr>
+              <a:t>&lt;- function(tweet) {</a:t>
+            </a:r>
+          </a:p>
+          <a:p>
+            <a:r>
+              <a:rPr lang="en-US" sz="1600" dirty="0">
+                <a:latin typeface="Consolas"/>
+                <a:cs typeface="Consolas"/>
+              </a:rPr>
+              <a:t>  words &lt;- </a:t>
+            </a:r>
+            <a:r>
+              <a:rPr lang="en-US" sz="1600" dirty="0" err="1">
+                <a:latin typeface="Consolas"/>
+                <a:cs typeface="Consolas"/>
+              </a:rPr>
+              <a:t>strsplit</a:t>
+            </a:r>
+            <a:r>
+              <a:rPr lang="en-US" sz="1600" dirty="0">
+                <a:latin typeface="Consolas"/>
+                <a:cs typeface="Consolas"/>
+              </a:rPr>
+              <a:t>(tweet, "\\s+")[[1]]</a:t>
+            </a:r>
+          </a:p>
+          <a:p>
+            <a:r>
+              <a:rPr lang="en-US" sz="1600" dirty="0">
+                <a:latin typeface="Consolas"/>
+                <a:cs typeface="Consolas"/>
+              </a:rPr>
+              <a:t>  rows &lt;- match(words, </a:t>
+            </a:r>
+            <a:r>
+              <a:rPr lang="en-US" sz="1600" dirty="0" err="1">
+                <a:latin typeface="Consolas"/>
+                <a:cs typeface="Consolas"/>
+              </a:rPr>
+              <a:t>swn$Term</a:t>
+            </a:r>
+            <a:r>
+              <a:rPr lang="en-US" sz="1600" dirty="0">
+                <a:latin typeface="Consolas"/>
+                <a:cs typeface="Consolas"/>
+              </a:rPr>
+              <a:t>)</a:t>
+            </a:r>
+          </a:p>
+          <a:p>
+            <a:r>
+              <a:rPr lang="en-US" sz="1600" dirty="0">
+                <a:latin typeface="Consolas"/>
+                <a:cs typeface="Consolas"/>
+              </a:rPr>
+              <a:t>  rows &lt;- rows[!</a:t>
+            </a:r>
+            <a:r>
+              <a:rPr lang="en-US" sz="1600" dirty="0" err="1">
+                <a:latin typeface="Consolas"/>
+                <a:cs typeface="Consolas"/>
+              </a:rPr>
+              <a:t>is.na</a:t>
+            </a:r>
+            <a:r>
+              <a:rPr lang="en-US" sz="1600" dirty="0">
+                <a:latin typeface="Consolas"/>
+                <a:cs typeface="Consolas"/>
+              </a:rPr>
+              <a:t>(rows)]</a:t>
+            </a:r>
+          </a:p>
+          <a:p>
+            <a:r>
+              <a:rPr lang="en-US" sz="1600" dirty="0">
+                <a:latin typeface="Consolas"/>
+                <a:cs typeface="Consolas"/>
+              </a:rPr>
+              <a:t>  </a:t>
+            </a:r>
+            <a:r>
+              <a:rPr lang="en-US" sz="1600" dirty="0" err="1">
+                <a:latin typeface="Consolas"/>
+                <a:cs typeface="Consolas"/>
+              </a:rPr>
+              <a:t>cs</a:t>
+            </a:r>
+            <a:r>
+              <a:rPr lang="en-US" sz="1600" dirty="0">
+                <a:latin typeface="Consolas"/>
+                <a:cs typeface="Consolas"/>
+              </a:rPr>
+              <a:t> &lt;- </a:t>
+            </a:r>
+            <a:r>
+              <a:rPr lang="en-US" sz="1600" dirty="0" err="1">
+                <a:latin typeface="Consolas"/>
+                <a:cs typeface="Consolas"/>
+              </a:rPr>
+              <a:t>colSums</a:t>
+            </a:r>
+            <a:r>
+              <a:rPr lang="en-US" sz="1600" dirty="0">
+                <a:latin typeface="Consolas"/>
+                <a:cs typeface="Consolas"/>
+              </a:rPr>
+              <a:t>(</a:t>
+            </a:r>
+            <a:r>
+              <a:rPr lang="en-US" sz="1600" dirty="0" err="1">
+                <a:latin typeface="Consolas"/>
+                <a:cs typeface="Consolas"/>
+              </a:rPr>
+              <a:t>swn</a:t>
+            </a:r>
+            <a:r>
+              <a:rPr lang="en-US" sz="1600" dirty="0">
+                <a:latin typeface="Consolas"/>
+                <a:cs typeface="Consolas"/>
+              </a:rPr>
+              <a:t>[</a:t>
+            </a:r>
+            <a:r>
+              <a:rPr lang="en-US" sz="1600" dirty="0" err="1">
+                <a:latin typeface="Consolas"/>
+                <a:cs typeface="Consolas"/>
+              </a:rPr>
+              <a:t>rows,c</a:t>
+            </a:r>
+            <a:r>
+              <a:rPr lang="en-US" sz="1600" dirty="0">
+                <a:latin typeface="Consolas"/>
+                <a:cs typeface="Consolas"/>
+              </a:rPr>
+              <a:t>(3,4)])</a:t>
+            </a:r>
+          </a:p>
+          <a:p>
+            <a:r>
+              <a:rPr lang="en-US" sz="1600" dirty="0">
+                <a:latin typeface="Consolas"/>
+                <a:cs typeface="Consolas"/>
+              </a:rPr>
+              <a:t>  return(</a:t>
+            </a:r>
+            <a:r>
+              <a:rPr lang="en-US" sz="1600" dirty="0" err="1">
+                <a:latin typeface="Consolas"/>
+                <a:cs typeface="Consolas"/>
+              </a:rPr>
+              <a:t>cs</a:t>
+            </a:r>
+            <a:r>
+              <a:rPr lang="en-US" sz="1600" dirty="0">
+                <a:latin typeface="Consolas"/>
+                <a:cs typeface="Consolas"/>
+              </a:rPr>
+              <a:t>[1]-</a:t>
+            </a:r>
+            <a:r>
+              <a:rPr lang="en-US" sz="1600" dirty="0" err="1">
+                <a:latin typeface="Consolas"/>
+                <a:cs typeface="Consolas"/>
+              </a:rPr>
+              <a:t>cs</a:t>
+            </a:r>
+            <a:r>
+              <a:rPr lang="en-US" sz="1600" dirty="0">
+                <a:latin typeface="Consolas"/>
+                <a:cs typeface="Consolas"/>
+              </a:rPr>
+              <a:t>[2])  </a:t>
+            </a:r>
+          </a:p>
+          <a:p>
+            <a:r>
+              <a:rPr lang="en-US" sz="1600" dirty="0">
+                <a:latin typeface="Consolas"/>
+                <a:cs typeface="Consolas"/>
+              </a:rPr>
+              <a:t>}</a:t>
+            </a:r>
+          </a:p>
+          <a:p>
+            <a:endParaRPr lang="en-US" sz="1600" dirty="0" smtClean="0">
+              <a:latin typeface="Consolas"/>
+              <a:cs typeface="Consolas"/>
+            </a:endParaRPr>
+          </a:p>
+        </p:txBody>
+      </p:sp>
+      <p:sp>
+        <p:nvSpPr>
+          <p:cNvPr id="5" name="TextBox 4"/>
+          <p:cNvSpPr txBox="1"/>
+          <p:nvPr/>
+        </p:nvSpPr>
+        <p:spPr>
+          <a:xfrm>
+            <a:off x="0" y="6488668"/>
+            <a:ext cx="2714593" cy="369332"/>
+          </a:xfrm>
+          <a:prstGeom prst="rect">
+            <a:avLst/>
+          </a:prstGeom>
+          <a:noFill/>
+        </p:spPr>
+        <p:txBody>
+          <a:bodyPr wrap="none" rtlCol="0">
+            <a:spAutoFit/>
+          </a:bodyPr>
+          <a:lstStyle/>
+          <a:p>
+            <a:r>
+              <a:rPr lang="en-US" i="1" dirty="0" smtClean="0"/>
+              <a:t>* overkill for this example</a:t>
+            </a:r>
+            <a:endParaRPr lang="en-US" i="1" dirty="0"/>
           </a:p>
         </p:txBody>
       </p:sp>
     </p:spTree>
     <p:extLst>
       <p:ext uri="{BB962C8B-B14F-4D97-AF65-F5344CB8AC3E}">
-        <p14:creationId xmlns:p14="http://schemas.microsoft.com/office/powerpoint/2010/main" val="3693672740"/>
+        <p14:creationId xmlns:p14="http://schemas.microsoft.com/office/powerpoint/2010/main" val="40293777"/>
       </p:ext>
     </p:extLst>
   </p:cSld>

</xml_diff>

<commit_message>
Added a time of day vis
</commit_message>
<xml_diff>
--- a/ctrug.pptx
+++ b/ctrug.pptx
@@ -5,7 +5,7 @@
     <p:sldMasterId id="2147483648" r:id="rId1"/>
   </p:sldMasterIdLst>
   <p:notesMasterIdLst>
-    <p:notesMasterId r:id="rId15"/>
+    <p:notesMasterId r:id="rId17"/>
   </p:notesMasterIdLst>
   <p:sldIdLst>
     <p:sldId id="256" r:id="rId2"/>
@@ -18,9 +18,11 @@
     <p:sldId id="265" r:id="rId9"/>
     <p:sldId id="267" r:id="rId10"/>
     <p:sldId id="268" r:id="rId11"/>
-    <p:sldId id="269" r:id="rId12"/>
-    <p:sldId id="260" r:id="rId13"/>
-    <p:sldId id="263" r:id="rId14"/>
+    <p:sldId id="271" r:id="rId12"/>
+    <p:sldId id="272" r:id="rId13"/>
+    <p:sldId id="269" r:id="rId14"/>
+    <p:sldId id="260" r:id="rId15"/>
+    <p:sldId id="263" r:id="rId16"/>
   </p:sldIdLst>
   <p:sldSz cx="9144000" cy="6858000" type="screen4x3"/>
   <p:notesSz cx="6858000" cy="9144000"/>
@@ -3562,7 +3564,19 @@
             <a:pPr algn="r"/>
             <a:r>
               <a:rPr lang="en-US" dirty="0" smtClean="0"/>
-              <a:t>Happy, Sad, Indifferent – Quantifying Text Sentiment in R</a:t>
+              <a:t>Happy, Sad, </a:t>
+            </a:r>
+            <a:r>
+              <a:rPr lang="en-US" dirty="0" smtClean="0"/>
+              <a:t>Indifferent</a:t>
+            </a:r>
+            <a:r>
+              <a:rPr lang="en-US" dirty="0" smtClean="0"/>
+              <a:t> … Quantifying </a:t>
+            </a:r>
+            <a:r>
+              <a:rPr lang="en-US" dirty="0" smtClean="0"/>
+              <a:t>Text Sentiment in R</a:t>
             </a:r>
             <a:endParaRPr lang="en-US" dirty="0"/>
           </a:p>
@@ -4139,6 +4153,807 @@
           <a:p>
             <a:r>
               <a:rPr lang="en-US" dirty="0" smtClean="0"/>
+              <a:t>Sentiment &amp; Time of Day</a:t>
+            </a:r>
+            <a:endParaRPr lang="en-US" dirty="0"/>
+          </a:p>
+        </p:txBody>
+      </p:sp>
+      <p:sp>
+        <p:nvSpPr>
+          <p:cNvPr id="3" name="Content Placeholder 2"/>
+          <p:cNvSpPr>
+            <a:spLocks noGrp="1"/>
+          </p:cNvSpPr>
+          <p:nvPr>
+            <p:ph idx="1"/>
+          </p:nvPr>
+        </p:nvSpPr>
+        <p:spPr>
+          <a:xfrm>
+            <a:off x="457200" y="1417638"/>
+            <a:ext cx="8229600" cy="4525963"/>
+          </a:xfrm>
+        </p:spPr>
+        <p:txBody>
+          <a:bodyPr/>
+          <a:lstStyle/>
+          <a:p>
+            <a:r>
+              <a:rPr lang="en-US" dirty="0" smtClean="0"/>
+              <a:t>Group tweets by hour and evaluate how proportions of positive, negative, etc.</a:t>
+            </a:r>
+            <a:endParaRPr lang="en-US" dirty="0"/>
+          </a:p>
+        </p:txBody>
+      </p:sp>
+      <p:sp>
+        <p:nvSpPr>
+          <p:cNvPr id="5" name="TextBox 4"/>
+          <p:cNvSpPr txBox="1"/>
+          <p:nvPr/>
+        </p:nvSpPr>
+        <p:spPr>
+          <a:xfrm>
+            <a:off x="253146" y="2526528"/>
+            <a:ext cx="8532704" cy="4278094"/>
+          </a:xfrm>
+          <a:prstGeom prst="rect">
+            <a:avLst/>
+          </a:prstGeom>
+          <a:solidFill>
+            <a:schemeClr val="bg2">
+              <a:lumMod val="90000"/>
+            </a:schemeClr>
+          </a:solidFill>
+          <a:ln>
+            <a:solidFill>
+              <a:schemeClr val="tx1"/>
+            </a:solidFill>
+          </a:ln>
+          <a:effectLst>
+            <a:outerShdw blurRad="50800" dist="38100" dir="2700000" algn="tl" rotWithShape="0">
+              <a:prstClr val="black">
+                <a:alpha val="40000"/>
+              </a:prstClr>
+            </a:outerShdw>
+          </a:effectLst>
+        </p:spPr>
+        <p:txBody>
+          <a:bodyPr wrap="none" rtlCol="0">
+            <a:spAutoFit/>
+          </a:bodyPr>
+          <a:lstStyle/>
+          <a:p>
+            <a:r>
+              <a:rPr lang="en-US" sz="1600" dirty="0" err="1">
+                <a:latin typeface="Consolas"/>
+                <a:cs typeface="Consolas"/>
+              </a:rPr>
+              <a:t>tmp</a:t>
+            </a:r>
+            <a:r>
+              <a:rPr lang="en-US" sz="1600" dirty="0">
+                <a:latin typeface="Consolas"/>
+                <a:cs typeface="Consolas"/>
+              </a:rPr>
+              <a:t> &lt;- d</a:t>
+            </a:r>
+          </a:p>
+          <a:p>
+            <a:r>
+              <a:rPr lang="en-US" sz="1600" dirty="0" err="1" smtClean="0">
+                <a:latin typeface="Consolas"/>
+                <a:cs typeface="Consolas"/>
+              </a:rPr>
+              <a:t>tmp$hour</a:t>
+            </a:r>
+            <a:r>
+              <a:rPr lang="en-US" sz="1600" dirty="0">
+                <a:latin typeface="Consolas"/>
+                <a:cs typeface="Consolas"/>
+              </a:rPr>
+              <a:t> </a:t>
+            </a:r>
+            <a:r>
+              <a:rPr lang="en-US" sz="1600" dirty="0" smtClean="0">
+                <a:latin typeface="Consolas"/>
+                <a:cs typeface="Consolas"/>
+              </a:rPr>
+              <a:t>&lt;- </a:t>
+            </a:r>
+            <a:r>
+              <a:rPr lang="en-US" sz="1600" dirty="0" err="1">
+                <a:latin typeface="Consolas"/>
+                <a:cs typeface="Consolas"/>
+              </a:rPr>
+              <a:t>strptime</a:t>
+            </a:r>
+            <a:r>
+              <a:rPr lang="en-US" sz="1600" dirty="0">
+                <a:latin typeface="Consolas"/>
+                <a:cs typeface="Consolas"/>
+              </a:rPr>
+              <a:t>(</a:t>
+            </a:r>
+            <a:r>
+              <a:rPr lang="en-US" sz="1600" dirty="0" err="1">
+                <a:latin typeface="Consolas"/>
+                <a:cs typeface="Consolas"/>
+              </a:rPr>
+              <a:t>d$time</a:t>
+            </a:r>
+            <a:r>
+              <a:rPr lang="en-US" sz="1600" dirty="0">
+                <a:latin typeface="Consolas"/>
+                <a:cs typeface="Consolas"/>
+              </a:rPr>
+              <a:t>, format='%a, %d %b %Y %H:%M'</a:t>
+            </a:r>
+            <a:r>
+              <a:rPr lang="en-US" sz="1600" dirty="0" smtClean="0">
+                <a:latin typeface="Consolas"/>
+                <a:cs typeface="Consolas"/>
+              </a:rPr>
+              <a:t>)$hour</a:t>
+            </a:r>
+            <a:endParaRPr lang="en-US" sz="1600" dirty="0">
+              <a:latin typeface="Consolas"/>
+              <a:cs typeface="Consolas"/>
+            </a:endParaRPr>
+          </a:p>
+          <a:p>
+            <a:endParaRPr lang="en-US" sz="1600" dirty="0" smtClean="0">
+              <a:latin typeface="Consolas"/>
+              <a:cs typeface="Consolas"/>
+            </a:endParaRPr>
+          </a:p>
+          <a:p>
+            <a:r>
+              <a:rPr lang="en-US" sz="1600" dirty="0" err="1" smtClean="0">
+                <a:latin typeface="Consolas"/>
+                <a:cs typeface="Consolas"/>
+              </a:rPr>
+              <a:t>tmp</a:t>
+            </a:r>
+            <a:r>
+              <a:rPr lang="en-US" sz="1600" dirty="0" smtClean="0">
+                <a:latin typeface="Consolas"/>
+                <a:cs typeface="Consolas"/>
+              </a:rPr>
+              <a:t> </a:t>
+            </a:r>
+            <a:r>
+              <a:rPr lang="en-US" sz="1600" dirty="0">
+                <a:latin typeface="Consolas"/>
+                <a:cs typeface="Consolas"/>
+              </a:rPr>
+              <a:t>&lt;- subset(</a:t>
+            </a:r>
+            <a:r>
+              <a:rPr lang="en-US" sz="1600" dirty="0" err="1">
+                <a:latin typeface="Consolas"/>
+                <a:cs typeface="Consolas"/>
+              </a:rPr>
+              <a:t>tmp</a:t>
+            </a:r>
+            <a:r>
+              <a:rPr lang="en-US" sz="1600" dirty="0">
+                <a:latin typeface="Consolas"/>
+                <a:cs typeface="Consolas"/>
+              </a:rPr>
+              <a:t>, !</a:t>
+            </a:r>
+            <a:r>
+              <a:rPr lang="en-US" sz="1600" dirty="0" err="1">
+                <a:latin typeface="Consolas"/>
+                <a:cs typeface="Consolas"/>
+              </a:rPr>
+              <a:t>is.na</a:t>
+            </a:r>
+            <a:r>
+              <a:rPr lang="en-US" sz="1600" dirty="0">
+                <a:latin typeface="Consolas"/>
+                <a:cs typeface="Consolas"/>
+              </a:rPr>
+              <a:t>(</a:t>
+            </a:r>
+            <a:r>
+              <a:rPr lang="en-US" sz="1600" dirty="0" err="1">
+                <a:latin typeface="Consolas"/>
+                <a:cs typeface="Consolas"/>
+              </a:rPr>
+              <a:t>swn</a:t>
+            </a:r>
+            <a:r>
+              <a:rPr lang="en-US" sz="1600" dirty="0">
+                <a:latin typeface="Consolas"/>
+                <a:cs typeface="Consolas"/>
+              </a:rPr>
+              <a:t>))</a:t>
+            </a:r>
+          </a:p>
+          <a:p>
+            <a:r>
+              <a:rPr lang="en-US" sz="1600" dirty="0" err="1">
+                <a:latin typeface="Consolas"/>
+                <a:cs typeface="Consolas"/>
+              </a:rPr>
+              <a:t>tmp$status</a:t>
+            </a:r>
+            <a:r>
+              <a:rPr lang="en-US" sz="1600" dirty="0">
+                <a:latin typeface="Consolas"/>
+                <a:cs typeface="Consolas"/>
+              </a:rPr>
+              <a:t> &lt;- </a:t>
+            </a:r>
+            <a:r>
+              <a:rPr lang="en-US" sz="1600" dirty="0" err="1">
+                <a:latin typeface="Consolas"/>
+                <a:cs typeface="Consolas"/>
+              </a:rPr>
+              <a:t>sapply</a:t>
+            </a:r>
+            <a:r>
+              <a:rPr lang="en-US" sz="1600" dirty="0">
+                <a:latin typeface="Consolas"/>
+                <a:cs typeface="Consolas"/>
+              </a:rPr>
+              <a:t>(</a:t>
+            </a:r>
+            <a:r>
+              <a:rPr lang="en-US" sz="1600" dirty="0" err="1">
+                <a:latin typeface="Consolas"/>
+                <a:cs typeface="Consolas"/>
+              </a:rPr>
+              <a:t>tmp$swn</a:t>
+            </a:r>
+            <a:r>
+              <a:rPr lang="en-US" sz="1600" dirty="0">
+                <a:latin typeface="Consolas"/>
+                <a:cs typeface="Consolas"/>
+              </a:rPr>
+              <a:t>, function(x) {</a:t>
+            </a:r>
+          </a:p>
+          <a:p>
+            <a:r>
+              <a:rPr lang="en-US" sz="1600" dirty="0">
+                <a:latin typeface="Consolas"/>
+                <a:cs typeface="Consolas"/>
+              </a:rPr>
+              <a:t>  if (x &gt; 0) return("Positive</a:t>
+            </a:r>
+            <a:r>
+              <a:rPr lang="en-US" sz="1600">
+                <a:latin typeface="Consolas"/>
+                <a:cs typeface="Consolas"/>
+              </a:rPr>
+              <a:t>"</a:t>
+            </a:r>
+            <a:r>
+              <a:rPr lang="en-US" sz="1600" smtClean="0">
+                <a:latin typeface="Consolas"/>
+                <a:cs typeface="Consolas"/>
+              </a:rPr>
+              <a:t>)</a:t>
+            </a:r>
+            <a:endParaRPr lang="en-US" sz="1600" dirty="0">
+              <a:latin typeface="Consolas"/>
+              <a:cs typeface="Consolas"/>
+            </a:endParaRPr>
+          </a:p>
+          <a:p>
+            <a:r>
+              <a:rPr lang="en-US" sz="1600" dirty="0">
+                <a:latin typeface="Consolas"/>
+                <a:cs typeface="Consolas"/>
+              </a:rPr>
+              <a:t>  else if (x &lt; 0) return("Negative")</a:t>
+            </a:r>
+          </a:p>
+          <a:p>
+            <a:r>
+              <a:rPr lang="en-US" sz="1600" dirty="0">
+                <a:latin typeface="Consolas"/>
+                <a:cs typeface="Consolas"/>
+              </a:rPr>
+              <a:t>  else return("Neutral")</a:t>
+            </a:r>
+          </a:p>
+          <a:p>
+            <a:r>
+              <a:rPr lang="en-US" sz="1600" dirty="0">
+                <a:latin typeface="Consolas"/>
+                <a:cs typeface="Consolas"/>
+              </a:rPr>
+              <a:t>}</a:t>
+            </a:r>
+            <a:r>
+              <a:rPr lang="en-US" sz="1600" dirty="0" smtClean="0">
+                <a:latin typeface="Consolas"/>
+                <a:cs typeface="Consolas"/>
+              </a:rPr>
+              <a:t>)</a:t>
+            </a:r>
+          </a:p>
+          <a:p>
+            <a:endParaRPr lang="en-US" sz="1600" dirty="0">
+              <a:latin typeface="Consolas"/>
+              <a:cs typeface="Consolas"/>
+            </a:endParaRPr>
+          </a:p>
+          <a:p>
+            <a:r>
+              <a:rPr lang="en-US" sz="1600" dirty="0" err="1">
+                <a:latin typeface="Consolas"/>
+                <a:cs typeface="Consolas"/>
+              </a:rPr>
+              <a:t>tmp</a:t>
+            </a:r>
+            <a:r>
+              <a:rPr lang="en-US" sz="1600" dirty="0">
+                <a:latin typeface="Consolas"/>
+                <a:cs typeface="Consolas"/>
+              </a:rPr>
+              <a:t> &lt;- </a:t>
+            </a:r>
+            <a:r>
+              <a:rPr lang="en-US" sz="1600" dirty="0" err="1">
+                <a:latin typeface="Consolas"/>
+                <a:cs typeface="Consolas"/>
+              </a:rPr>
+              <a:t>data.frame</a:t>
+            </a:r>
+            <a:r>
+              <a:rPr lang="en-US" sz="1600" dirty="0">
+                <a:latin typeface="Consolas"/>
+                <a:cs typeface="Consolas"/>
+              </a:rPr>
+              <a:t>(</a:t>
+            </a:r>
+            <a:r>
+              <a:rPr lang="en-US" sz="1600" dirty="0" err="1">
+                <a:latin typeface="Consolas"/>
+                <a:cs typeface="Consolas"/>
+              </a:rPr>
+              <a:t>do.call</a:t>
+            </a:r>
+            <a:r>
+              <a:rPr lang="en-US" sz="1600" dirty="0">
+                <a:latin typeface="Consolas"/>
+                <a:cs typeface="Consolas"/>
+              </a:rPr>
+              <a:t>('</a:t>
+            </a:r>
+            <a:r>
+              <a:rPr lang="en-US" sz="1600" dirty="0" err="1">
+                <a:latin typeface="Consolas"/>
+                <a:cs typeface="Consolas"/>
+              </a:rPr>
+              <a:t>rbind</a:t>
+            </a:r>
+            <a:r>
+              <a:rPr lang="en-US" sz="1600" dirty="0">
+                <a:latin typeface="Consolas"/>
+                <a:cs typeface="Consolas"/>
+              </a:rPr>
+              <a:t>', </a:t>
+            </a:r>
+            <a:endParaRPr lang="en-US" sz="1600" dirty="0" smtClean="0">
+              <a:latin typeface="Consolas"/>
+              <a:cs typeface="Consolas"/>
+            </a:endParaRPr>
+          </a:p>
+          <a:p>
+            <a:r>
+              <a:rPr lang="en-US" sz="1600" dirty="0">
+                <a:latin typeface="Consolas"/>
+                <a:cs typeface="Consolas"/>
+              </a:rPr>
+              <a:t>	</a:t>
+            </a:r>
+            <a:r>
+              <a:rPr lang="en-US" sz="1600" dirty="0" smtClean="0">
+                <a:latin typeface="Consolas"/>
+                <a:cs typeface="Consolas"/>
+              </a:rPr>
+              <a:t>		          by</a:t>
+            </a:r>
+            <a:r>
+              <a:rPr lang="en-US" sz="1600" dirty="0">
+                <a:latin typeface="Consolas"/>
+                <a:cs typeface="Consolas"/>
+              </a:rPr>
+              <a:t>(</a:t>
+            </a:r>
+            <a:r>
+              <a:rPr lang="en-US" sz="1600" dirty="0" err="1">
+                <a:latin typeface="Consolas"/>
+                <a:cs typeface="Consolas"/>
+              </a:rPr>
+              <a:t>tmp</a:t>
+            </a:r>
+            <a:r>
+              <a:rPr lang="en-US" sz="1600" dirty="0">
+                <a:latin typeface="Consolas"/>
+                <a:cs typeface="Consolas"/>
+              </a:rPr>
+              <a:t>, </a:t>
+            </a:r>
+            <a:r>
+              <a:rPr lang="en-US" sz="1600" dirty="0" err="1">
+                <a:latin typeface="Consolas"/>
+                <a:cs typeface="Consolas"/>
+              </a:rPr>
+              <a:t>tmp$hour</a:t>
+            </a:r>
+            <a:r>
+              <a:rPr lang="en-US" sz="1600" dirty="0">
+                <a:latin typeface="Consolas"/>
+                <a:cs typeface="Consolas"/>
+              </a:rPr>
+              <a:t>, function(x) table(</a:t>
+            </a:r>
+            <a:r>
+              <a:rPr lang="en-US" sz="1600" dirty="0" err="1">
+                <a:latin typeface="Consolas"/>
+                <a:cs typeface="Consolas"/>
+              </a:rPr>
+              <a:t>x$status</a:t>
+            </a:r>
+            <a:r>
+              <a:rPr lang="en-US" sz="1600" dirty="0">
+                <a:latin typeface="Consolas"/>
+                <a:cs typeface="Consolas"/>
+              </a:rPr>
+              <a:t>))))</a:t>
+            </a:r>
+          </a:p>
+          <a:p>
+            <a:r>
+              <a:rPr lang="en-US" sz="1600" dirty="0" err="1">
+                <a:latin typeface="Consolas"/>
+                <a:cs typeface="Consolas"/>
+              </a:rPr>
+              <a:t>tmp$Hour</a:t>
+            </a:r>
+            <a:r>
+              <a:rPr lang="en-US" sz="1600" dirty="0">
+                <a:latin typeface="Consolas"/>
+                <a:cs typeface="Consolas"/>
+              </a:rPr>
+              <a:t> &lt;- factor(</a:t>
+            </a:r>
+            <a:r>
+              <a:rPr lang="en-US" sz="1600" dirty="0" err="1">
+                <a:latin typeface="Consolas"/>
+                <a:cs typeface="Consolas"/>
+              </a:rPr>
+              <a:t>rownames</a:t>
+            </a:r>
+            <a:r>
+              <a:rPr lang="en-US" sz="1600" dirty="0">
+                <a:latin typeface="Consolas"/>
+                <a:cs typeface="Consolas"/>
+              </a:rPr>
+              <a:t>(</a:t>
+            </a:r>
+            <a:r>
+              <a:rPr lang="en-US" sz="1600" dirty="0" err="1">
+                <a:latin typeface="Consolas"/>
+                <a:cs typeface="Consolas"/>
+              </a:rPr>
+              <a:t>tmp</a:t>
+            </a:r>
+            <a:r>
+              <a:rPr lang="en-US" sz="1600" dirty="0">
+                <a:latin typeface="Consolas"/>
+                <a:cs typeface="Consolas"/>
+              </a:rPr>
+              <a:t>), levels=0:23)</a:t>
+            </a:r>
+          </a:p>
+          <a:p>
+            <a:r>
+              <a:rPr lang="en-US" sz="1600" dirty="0" err="1">
+                <a:latin typeface="Consolas"/>
+                <a:cs typeface="Consolas"/>
+              </a:rPr>
+              <a:t>tmp</a:t>
+            </a:r>
+            <a:r>
+              <a:rPr lang="en-US" sz="1600" dirty="0">
+                <a:latin typeface="Consolas"/>
+                <a:cs typeface="Consolas"/>
+              </a:rPr>
+              <a:t> &lt;- melt(</a:t>
+            </a:r>
+            <a:r>
+              <a:rPr lang="en-US" sz="1600" dirty="0" err="1">
+                <a:latin typeface="Consolas"/>
+                <a:cs typeface="Consolas"/>
+              </a:rPr>
+              <a:t>tmp</a:t>
+            </a:r>
+            <a:r>
+              <a:rPr lang="en-US" sz="1600" dirty="0">
+                <a:latin typeface="Consolas"/>
+                <a:cs typeface="Consolas"/>
+              </a:rPr>
+              <a:t>, id='Hour', </a:t>
+            </a:r>
+            <a:r>
+              <a:rPr lang="en-US" sz="1600" dirty="0" err="1">
+                <a:latin typeface="Consolas"/>
+                <a:cs typeface="Consolas"/>
+              </a:rPr>
+              <a:t>variable_name</a:t>
+            </a:r>
+            <a:r>
+              <a:rPr lang="en-US" sz="1600" dirty="0">
+                <a:latin typeface="Consolas"/>
+                <a:cs typeface="Consolas"/>
+              </a:rPr>
+              <a:t>='Sentiment')</a:t>
+            </a:r>
+          </a:p>
+          <a:p>
+            <a:r>
+              <a:rPr lang="en-US" sz="1600" dirty="0" err="1">
+                <a:latin typeface="Consolas"/>
+                <a:cs typeface="Consolas"/>
+              </a:rPr>
+              <a:t>ggplot</a:t>
+            </a:r>
+            <a:r>
+              <a:rPr lang="en-US" sz="1600" dirty="0">
+                <a:latin typeface="Consolas"/>
+                <a:cs typeface="Consolas"/>
+              </a:rPr>
+              <a:t>(</a:t>
+            </a:r>
+            <a:r>
+              <a:rPr lang="en-US" sz="1600" dirty="0" err="1">
+                <a:latin typeface="Consolas"/>
+                <a:cs typeface="Consolas"/>
+              </a:rPr>
+              <a:t>tmp</a:t>
+            </a:r>
+            <a:r>
+              <a:rPr lang="en-US" sz="1600" dirty="0">
+                <a:latin typeface="Consolas"/>
+                <a:cs typeface="Consolas"/>
+              </a:rPr>
+              <a:t>, </a:t>
+            </a:r>
+            <a:r>
+              <a:rPr lang="en-US" sz="1600" dirty="0" err="1">
+                <a:latin typeface="Consolas"/>
+                <a:cs typeface="Consolas"/>
+              </a:rPr>
+              <a:t>aes</a:t>
+            </a:r>
+            <a:r>
+              <a:rPr lang="en-US" sz="1600" dirty="0">
+                <a:latin typeface="Consolas"/>
+                <a:cs typeface="Consolas"/>
+              </a:rPr>
+              <a:t>(x=</a:t>
+            </a:r>
+            <a:r>
+              <a:rPr lang="en-US" sz="1600" dirty="0" err="1">
+                <a:latin typeface="Consolas"/>
+                <a:cs typeface="Consolas"/>
+              </a:rPr>
+              <a:t>Hour,y</a:t>
+            </a:r>
+            <a:r>
+              <a:rPr lang="en-US" sz="1600" dirty="0">
+                <a:latin typeface="Consolas"/>
+                <a:cs typeface="Consolas"/>
+              </a:rPr>
+              <a:t>=</a:t>
+            </a:r>
+            <a:r>
+              <a:rPr lang="en-US" sz="1600" dirty="0" err="1">
+                <a:latin typeface="Consolas"/>
+                <a:cs typeface="Consolas"/>
+              </a:rPr>
+              <a:t>value,fill</a:t>
+            </a:r>
+            <a:r>
+              <a:rPr lang="en-US" sz="1600" dirty="0">
+                <a:latin typeface="Consolas"/>
+                <a:cs typeface="Consolas"/>
+              </a:rPr>
+              <a:t>=Sentiment))+</a:t>
+            </a:r>
+            <a:r>
+              <a:rPr lang="en-US" sz="1600" dirty="0" err="1">
+                <a:latin typeface="Consolas"/>
+                <a:cs typeface="Consolas"/>
+              </a:rPr>
+              <a:t>geom_bar</a:t>
+            </a:r>
+            <a:r>
+              <a:rPr lang="en-US" sz="1600" dirty="0">
+                <a:latin typeface="Consolas"/>
+                <a:cs typeface="Consolas"/>
+              </a:rPr>
+              <a:t>(position='fill')+</a:t>
+            </a:r>
+          </a:p>
+          <a:p>
+            <a:r>
+              <a:rPr lang="en-US" sz="1600" dirty="0">
+                <a:latin typeface="Consolas"/>
+                <a:cs typeface="Consolas"/>
+              </a:rPr>
+              <a:t>  </a:t>
+            </a:r>
+            <a:r>
+              <a:rPr lang="en-US" sz="1600" dirty="0" err="1">
+                <a:latin typeface="Consolas"/>
+                <a:cs typeface="Consolas"/>
+              </a:rPr>
+              <a:t>xlab</a:t>
+            </a:r>
+            <a:r>
+              <a:rPr lang="en-US" sz="1600" dirty="0">
+                <a:latin typeface="Consolas"/>
+                <a:cs typeface="Consolas"/>
+              </a:rPr>
+              <a:t>("")+</a:t>
+            </a:r>
+            <a:r>
+              <a:rPr lang="en-US" sz="1600" dirty="0" err="1">
+                <a:latin typeface="Consolas"/>
+                <a:cs typeface="Consolas"/>
+              </a:rPr>
+              <a:t>ylab</a:t>
+            </a:r>
+            <a:r>
+              <a:rPr lang="en-US" sz="1600" dirty="0">
+                <a:latin typeface="Consolas"/>
+                <a:cs typeface="Consolas"/>
+              </a:rPr>
+              <a:t>("Proportion")</a:t>
+            </a:r>
+          </a:p>
+          <a:p>
+            <a:endParaRPr lang="en-US" sz="1600" dirty="0" smtClean="0">
+              <a:latin typeface="Consolas"/>
+              <a:cs typeface="Consolas"/>
+            </a:endParaRPr>
+          </a:p>
+        </p:txBody>
+      </p:sp>
+    </p:spTree>
+    <p:extLst>
+      <p:ext uri="{BB962C8B-B14F-4D97-AF65-F5344CB8AC3E}">
+        <p14:creationId xmlns:p14="http://schemas.microsoft.com/office/powerpoint/2010/main" val="2161597356"/>
+      </p:ext>
+    </p:extLst>
+  </p:cSld>
+  <p:clrMapOvr>
+    <a:masterClrMapping/>
+  </p:clrMapOvr>
+</p:sld>
+</file>
+
+<file path=ppt/slides/slide12.xml><?xml version="1.0" encoding="utf-8"?>
+<p:sld xmlns:a="http://schemas.openxmlformats.org/drawingml/2006/main" xmlns:r="http://schemas.openxmlformats.org/officeDocument/2006/relationships" xmlns:p="http://schemas.openxmlformats.org/presentationml/2006/main">
+  <p:cSld>
+    <p:spTree>
+      <p:nvGrpSpPr>
+        <p:cNvPr id="1" name=""/>
+        <p:cNvGrpSpPr/>
+        <p:nvPr/>
+      </p:nvGrpSpPr>
+      <p:grpSpPr>
+        <a:xfrm>
+          <a:off x="0" y="0"/>
+          <a:ext cx="0" cy="0"/>
+          <a:chOff x="0" y="0"/>
+          <a:chExt cx="0" cy="0"/>
+        </a:xfrm>
+      </p:grpSpPr>
+      <p:sp>
+        <p:nvSpPr>
+          <p:cNvPr id="2" name="Title 1"/>
+          <p:cNvSpPr>
+            <a:spLocks noGrp="1"/>
+          </p:cNvSpPr>
+          <p:nvPr>
+            <p:ph type="title"/>
+          </p:nvPr>
+        </p:nvSpPr>
+        <p:spPr/>
+        <p:txBody>
+          <a:bodyPr/>
+          <a:lstStyle/>
+          <a:p>
+            <a:r>
+              <a:rPr lang="en-US" dirty="0" smtClean="0"/>
+              <a:t>Sentiment &amp; Time of Day</a:t>
+            </a:r>
+            <a:endParaRPr lang="en-US" dirty="0"/>
+          </a:p>
+        </p:txBody>
+      </p:sp>
+      <p:pic>
+        <p:nvPicPr>
+          <p:cNvPr id="4" name="Picture 3"/>
+          <p:cNvPicPr>
+            <a:picLocks noChangeAspect="1"/>
+          </p:cNvPicPr>
+          <p:nvPr/>
+        </p:nvPicPr>
+        <p:blipFill>
+          <a:blip r:embed="rId2"/>
+          <a:stretch>
+            <a:fillRect/>
+          </a:stretch>
+        </p:blipFill>
+        <p:spPr>
+          <a:xfrm>
+            <a:off x="79904" y="1417638"/>
+            <a:ext cx="9038696" cy="5156200"/>
+          </a:xfrm>
+          <a:prstGeom prst="rect">
+            <a:avLst/>
+          </a:prstGeom>
+        </p:spPr>
+      </p:pic>
+    </p:spTree>
+    <p:extLst>
+      <p:ext uri="{BB962C8B-B14F-4D97-AF65-F5344CB8AC3E}">
+        <p14:creationId xmlns:p14="http://schemas.microsoft.com/office/powerpoint/2010/main" val="3018031862"/>
+      </p:ext>
+    </p:extLst>
+  </p:cSld>
+  <p:clrMapOvr>
+    <a:masterClrMapping/>
+  </p:clrMapOvr>
+</p:sld>
+</file>
+
+<file path=ppt/slides/slide13.xml><?xml version="1.0" encoding="utf-8"?>
+<p:sld xmlns:a="http://schemas.openxmlformats.org/drawingml/2006/main" xmlns:r="http://schemas.openxmlformats.org/officeDocument/2006/relationships" xmlns:p="http://schemas.openxmlformats.org/presentationml/2006/main">
+  <p:cSld>
+    <p:spTree>
+      <p:nvGrpSpPr>
+        <p:cNvPr id="1" name=""/>
+        <p:cNvGrpSpPr/>
+        <p:nvPr/>
+      </p:nvGrpSpPr>
+      <p:grpSpPr>
+        <a:xfrm>
+          <a:off x="0" y="0"/>
+          <a:ext cx="0" cy="0"/>
+          <a:chOff x="0" y="0"/>
+          <a:chExt cx="0" cy="0"/>
+        </a:xfrm>
+      </p:grpSpPr>
+      <p:sp>
+        <p:nvSpPr>
+          <p:cNvPr id="2" name="Title 1"/>
+          <p:cNvSpPr>
+            <a:spLocks noGrp="1"/>
+          </p:cNvSpPr>
+          <p:nvPr>
+            <p:ph type="title"/>
+          </p:nvPr>
+        </p:nvSpPr>
+        <p:spPr/>
+        <p:txBody>
+          <a:bodyPr/>
+          <a:lstStyle/>
+          <a:p>
+            <a:r>
+              <a:rPr lang="en-US" dirty="0" smtClean="0"/>
               <a:t>Contradictions?</a:t>
             </a:r>
             <a:endParaRPr lang="en-US" dirty="0"/>
@@ -4447,7 +5262,7 @@
 </p:sld>
 </file>
 
-<file path=ppt/slides/slide12.xml><?xml version="1.0" encoding="utf-8"?>
+<file path=ppt/slides/slide14.xml><?xml version="1.0" encoding="utf-8"?>
 <p:sld xmlns:a="http://schemas.openxmlformats.org/drawingml/2006/main" xmlns:r="http://schemas.openxmlformats.org/officeDocument/2006/relationships" xmlns:p="http://schemas.openxmlformats.org/presentationml/2006/main">
   <p:cSld>
     <p:spTree>
@@ -4521,7 +5336,12 @@
             <p:ph idx="1"/>
           </p:nvPr>
         </p:nvSpPr>
-        <p:spPr/>
+        <p:spPr>
+          <a:xfrm>
+            <a:off x="381000" y="1600200"/>
+            <a:ext cx="8229600" cy="4525963"/>
+          </a:xfrm>
+        </p:spPr>
         <p:txBody>
           <a:bodyPr/>
           <a:lstStyle/>
@@ -4588,7 +5408,7 @@
 </p:sld>
 </file>
 
-<file path=ppt/slides/slide13.xml><?xml version="1.0" encoding="utf-8"?>
+<file path=ppt/slides/slide15.xml><?xml version="1.0" encoding="utf-8"?>
 <p:sld xmlns:a="http://schemas.openxmlformats.org/drawingml/2006/main" xmlns:r="http://schemas.openxmlformats.org/officeDocument/2006/relationships" xmlns:p="http://schemas.openxmlformats.org/presentationml/2006/main">
   <p:cSld>
     <p:spTree>
@@ -4638,9 +5458,16 @@
             <p:ph idx="1"/>
           </p:nvPr>
         </p:nvSpPr>
-        <p:spPr/>
-        <p:txBody>
-          <a:bodyPr/>
+        <p:spPr>
+          <a:xfrm>
+            <a:off x="457200" y="1600200"/>
+            <a:ext cx="8229600" cy="5054600"/>
+          </a:xfrm>
+        </p:spPr>
+        <p:txBody>
+          <a:bodyPr>
+            <a:normAutofit lnSpcReduction="10000"/>
+          </a:bodyPr>
           <a:lstStyle/>
           <a:p>
             <a:r>
@@ -4664,18 +5491,38 @@
           <a:p>
             <a:r>
               <a:rPr lang="en-US" dirty="0"/>
-              <a:t>Sentiment scores should probably be modified by context</a:t>
+              <a:t>Sentiment scores should probably be modified by </a:t>
+            </a:r>
+            <a:r>
+              <a:rPr lang="en-US" dirty="0" smtClean="0"/>
+              <a:t>context</a:t>
+            </a:r>
+          </a:p>
+          <a:p>
+            <a:r>
+              <a:rPr lang="en-US" dirty="0" smtClean="0"/>
+              <a:t>Lots of M/L opportunities</a:t>
             </a:r>
           </a:p>
           <a:p>
             <a:pPr lvl="1"/>
             <a:r>
               <a:rPr lang="en-US" dirty="0" smtClean="0"/>
-              <a:t>ML methods will be sensitive to the nature of the </a:t>
-            </a:r>
-            <a:r>
-              <a:rPr lang="en-US" smtClean="0"/>
-              <a:t>corpora employed</a:t>
+              <a:t>Spatial analysis</a:t>
+            </a:r>
+          </a:p>
+          <a:p>
+            <a:pPr lvl="1"/>
+            <a:r>
+              <a:rPr lang="en-US" dirty="0" smtClean="0"/>
+              <a:t>Topic modeling / clustering</a:t>
+            </a:r>
+          </a:p>
+          <a:p>
+            <a:pPr lvl="1"/>
+            <a:r>
+              <a:rPr lang="en-US" dirty="0" smtClean="0"/>
+              <a:t>Predictive models</a:t>
             </a:r>
             <a:endParaRPr lang="en-US" dirty="0"/>
           </a:p>
@@ -5009,16 +5856,13 @@
             </a:r>
             <a:r>
               <a:rPr lang="en-US" dirty="0" smtClean="0"/>
-              <a:t>, HTML escape codes and </a:t>
+              <a:t>, HTML escape codes, punctuation </a:t>
             </a:r>
             <a:r>
               <a:rPr lang="en-US" dirty="0" err="1" smtClean="0"/>
-              <a:t>misc</a:t>
-            </a:r>
-            <a:r>
-              <a:rPr lang="en-US" dirty="0" smtClean="0"/>
-              <a:t> items</a:t>
-            </a:r>
+              <a:t>etc</a:t>
+            </a:r>
+            <a:endParaRPr lang="en-US" dirty="0" smtClean="0"/>
           </a:p>
           <a:p>
             <a:endParaRPr lang="en-US" dirty="0"/>

</xml_diff>

<commit_message>
some updates to the slides
</commit_message>
<xml_diff>
--- a/ctrug.pptx
+++ b/ctrug.pptx
@@ -4181,7 +4181,15 @@
           <a:p>
             <a:r>
               <a:rPr lang="en-US" dirty="0" smtClean="0"/>
-              <a:t>Group tweets by hour and evaluate how proportions of positive, negative, etc.</a:t>
+              <a:t>Group tweets by hour and evaluate how proportions of positive, negative, </a:t>
+            </a:r>
+            <a:r>
+              <a:rPr lang="en-US" dirty="0" err="1" smtClean="0"/>
+              <a:t>etc</a:t>
+            </a:r>
+            <a:r>
+              <a:rPr lang="en-US" dirty="0" smtClean="0"/>
+              <a:t> vary .</a:t>
             </a:r>
             <a:endParaRPr lang="en-US" dirty="0"/>
           </a:p>
@@ -4423,17 +4431,10 @@
                 <a:latin typeface="Consolas"/>
                 <a:cs typeface="Consolas"/>
               </a:rPr>
-              <a:t>  if (x &gt; 0) return("Positive</a:t>
-            </a:r>
-            <a:r>
-              <a:rPr lang="en-US" sz="1600">
-                <a:latin typeface="Consolas"/>
-                <a:cs typeface="Consolas"/>
-              </a:rPr>
-              <a:t>"</a:t>
-            </a:r>
-            <a:r>
-              <a:rPr lang="en-US" sz="1600" smtClean="0">
+              <a:t>  if (x &gt; 0) return("Positive"</a:t>
+            </a:r>
+            <a:r>
+              <a:rPr lang="en-US" sz="1600" dirty="0" smtClean="0">
                 <a:latin typeface="Consolas"/>
                 <a:cs typeface="Consolas"/>
               </a:rPr>
@@ -5708,7 +5709,33 @@
           <a:p>
             <a:r>
               <a:rPr lang="en-US" dirty="0" smtClean="0"/>
-              <a:t>Accessing Twitter is </a:t>
+              <a:t>Based on a collaboration with Prof. Debs </a:t>
+            </a:r>
+            <a:r>
+              <a:rPr lang="en-US" dirty="0" err="1" smtClean="0"/>
+              <a:t>Ghosh</a:t>
+            </a:r>
+            <a:r>
+              <a:rPr lang="en-US" dirty="0" smtClean="0"/>
+              <a:t> (</a:t>
+            </a:r>
+            <a:r>
+              <a:rPr lang="en-US" dirty="0" err="1" smtClean="0"/>
+              <a:t>Uconn</a:t>
+            </a:r>
+            <a:r>
+              <a:rPr lang="en-US" dirty="0" smtClean="0"/>
+              <a:t>), studying obesity &amp; social media</a:t>
+            </a:r>
+          </a:p>
+          <a:p>
+            <a:r>
+              <a:rPr lang="en-US" dirty="0" smtClean="0"/>
+              <a:t>Accessing </a:t>
+            </a:r>
+            <a:r>
+              <a:rPr lang="en-US" dirty="0" smtClean="0"/>
+              <a:t>Twitter is </a:t>
             </a:r>
             <a:r>
               <a:rPr lang="en-US" dirty="0" smtClean="0"/>
@@ -5723,7 +5750,15 @@
             <a:pPr lvl="1"/>
             <a:r>
               <a:rPr lang="en-US" dirty="0" smtClean="0"/>
-              <a:t>We obtained tweets via a PHP client running over an extended period of </a:t>
+              <a:t>We obtained tweets </a:t>
+            </a:r>
+            <a:r>
+              <a:rPr lang="en-US" dirty="0" smtClean="0"/>
+              <a:t>via </a:t>
+            </a:r>
+            <a:r>
+              <a:rPr lang="en-US" dirty="0" smtClean="0"/>
+              <a:t>a PHP client running over an extended period of </a:t>
             </a:r>
             <a:r>
               <a:rPr lang="en-US" dirty="0" smtClean="0"/>

</xml_diff>